<commit_message>
Update Presentation, and serial-prefix figure
</commit_message>
<xml_diff>
--- a/Presentation/Presentation.pptx
+++ b/Presentation/Presentation.pptx
@@ -2,14 +2,18 @@
 <file path=ppt/presentation.xml><?xml version="1.0" encoding="utf-8"?>
 <p:presentation xmlns:a="http://schemas.openxmlformats.org/drawingml/2006/main" xmlns:r="http://schemas.openxmlformats.org/officeDocument/2006/relationships" xmlns:p="http://schemas.openxmlformats.org/presentationml/2006/main" showSpecialPlsOnTitleSld="0" saveSubsetFonts="1">
   <p:sldMasterIdLst>
-    <p:sldMasterId id="2147483648" r:id="rId1"/>
+    <p:sldMasterId id="2147483708" r:id="rId1"/>
   </p:sldMasterIdLst>
   <p:notesMasterIdLst>
-    <p:notesMasterId r:id="rId4"/>
+    <p:notesMasterId r:id="rId8"/>
   </p:notesMasterIdLst>
   <p:sldIdLst>
     <p:sldId id="256" r:id="rId2"/>
     <p:sldId id="257" r:id="rId3"/>
+    <p:sldId id="258" r:id="rId4"/>
+    <p:sldId id="259" r:id="rId5"/>
+    <p:sldId id="260" r:id="rId6"/>
+    <p:sldId id="261" r:id="rId7"/>
   </p:sldIdLst>
   <p:sldSz cx="12192000" cy="6858000"/>
   <p:notesSz cx="6858000" cy="9144000"/>
@@ -17,7 +21,7 @@
     <a:defPPr>
       <a:defRPr lang="en-US"/>
     </a:defPPr>
-    <a:lvl1pPr marL="0" algn="l" defTabSz="914400" rtl="0" eaLnBrk="1" latinLnBrk="0" hangingPunct="1">
+    <a:lvl1pPr marL="0" algn="l" defTabSz="457200" rtl="0" eaLnBrk="1" latinLnBrk="0" hangingPunct="1">
       <a:defRPr sz="1800" kern="1200">
         <a:solidFill>
           <a:schemeClr val="tx1"/>
@@ -27,7 +31,7 @@
         <a:cs typeface="+mn-cs"/>
       </a:defRPr>
     </a:lvl1pPr>
-    <a:lvl2pPr marL="457200" algn="l" defTabSz="914400" rtl="0" eaLnBrk="1" latinLnBrk="0" hangingPunct="1">
+    <a:lvl2pPr marL="457200" algn="l" defTabSz="457200" rtl="0" eaLnBrk="1" latinLnBrk="0" hangingPunct="1">
       <a:defRPr sz="1800" kern="1200">
         <a:solidFill>
           <a:schemeClr val="tx1"/>
@@ -37,7 +41,7 @@
         <a:cs typeface="+mn-cs"/>
       </a:defRPr>
     </a:lvl2pPr>
-    <a:lvl3pPr marL="914400" algn="l" defTabSz="914400" rtl="0" eaLnBrk="1" latinLnBrk="0" hangingPunct="1">
+    <a:lvl3pPr marL="914400" algn="l" defTabSz="457200" rtl="0" eaLnBrk="1" latinLnBrk="0" hangingPunct="1">
       <a:defRPr sz="1800" kern="1200">
         <a:solidFill>
           <a:schemeClr val="tx1"/>
@@ -47,7 +51,7 @@
         <a:cs typeface="+mn-cs"/>
       </a:defRPr>
     </a:lvl3pPr>
-    <a:lvl4pPr marL="1371600" algn="l" defTabSz="914400" rtl="0" eaLnBrk="1" latinLnBrk="0" hangingPunct="1">
+    <a:lvl4pPr marL="1371600" algn="l" defTabSz="457200" rtl="0" eaLnBrk="1" latinLnBrk="0" hangingPunct="1">
       <a:defRPr sz="1800" kern="1200">
         <a:solidFill>
           <a:schemeClr val="tx1"/>
@@ -57,7 +61,7 @@
         <a:cs typeface="+mn-cs"/>
       </a:defRPr>
     </a:lvl4pPr>
-    <a:lvl5pPr marL="1828800" algn="l" defTabSz="914400" rtl="0" eaLnBrk="1" latinLnBrk="0" hangingPunct="1">
+    <a:lvl5pPr marL="1828800" algn="l" defTabSz="457200" rtl="0" eaLnBrk="1" latinLnBrk="0" hangingPunct="1">
       <a:defRPr sz="1800" kern="1200">
         <a:solidFill>
           <a:schemeClr val="tx1"/>
@@ -67,7 +71,7 @@
         <a:cs typeface="+mn-cs"/>
       </a:defRPr>
     </a:lvl5pPr>
-    <a:lvl6pPr marL="2286000" algn="l" defTabSz="914400" rtl="0" eaLnBrk="1" latinLnBrk="0" hangingPunct="1">
+    <a:lvl6pPr marL="2286000" algn="l" defTabSz="457200" rtl="0" eaLnBrk="1" latinLnBrk="0" hangingPunct="1">
       <a:defRPr sz="1800" kern="1200">
         <a:solidFill>
           <a:schemeClr val="tx1"/>
@@ -77,7 +81,7 @@
         <a:cs typeface="+mn-cs"/>
       </a:defRPr>
     </a:lvl6pPr>
-    <a:lvl7pPr marL="2743200" algn="l" defTabSz="914400" rtl="0" eaLnBrk="1" latinLnBrk="0" hangingPunct="1">
+    <a:lvl7pPr marL="2743200" algn="l" defTabSz="457200" rtl="0" eaLnBrk="1" latinLnBrk="0" hangingPunct="1">
       <a:defRPr sz="1800" kern="1200">
         <a:solidFill>
           <a:schemeClr val="tx1"/>
@@ -87,7 +91,7 @@
         <a:cs typeface="+mn-cs"/>
       </a:defRPr>
     </a:lvl7pPr>
-    <a:lvl8pPr marL="3200400" algn="l" defTabSz="914400" rtl="0" eaLnBrk="1" latinLnBrk="0" hangingPunct="1">
+    <a:lvl8pPr marL="3200400" algn="l" defTabSz="457200" rtl="0" eaLnBrk="1" latinLnBrk="0" hangingPunct="1">
       <a:defRPr sz="1800" kern="1200">
         <a:solidFill>
           <a:schemeClr val="tx1"/>
@@ -97,7 +101,7 @@
         <a:cs typeface="+mn-cs"/>
       </a:defRPr>
     </a:lvl8pPr>
-    <a:lvl9pPr marL="3657600" algn="l" defTabSz="914400" rtl="0" eaLnBrk="1" latinLnBrk="0" hangingPunct="1">
+    <a:lvl9pPr marL="3657600" algn="l" defTabSz="457200" rtl="0" eaLnBrk="1" latinLnBrk="0" hangingPunct="1">
       <a:defRPr sz="1800" kern="1200">
         <a:solidFill>
           <a:schemeClr val="tx1"/>
@@ -108,6 +112,11 @@
       </a:defRPr>
     </a:lvl9pPr>
   </p:defaultTextStyle>
+  <p:extLst>
+    <p:ext uri="{EFAFB233-063F-42B5-8137-9DF3F51BA10A}">
+      <p15:sldGuideLst xmlns:p15="http://schemas.microsoft.com/office/powerpoint/2012/main"/>
+    </p:ext>
+  </p:extLst>
 </p:presentation>
 </file>
 
@@ -193,7 +202,7 @@
           <a:p>
             <a:fld id="{1EF55B2A-A1B1-48BE-AF50-1397049CD154}" type="datetimeFigureOut">
               <a:rPr lang="en-US" smtClean="0"/>
-              <a:t>6/15/2018</a:t>
+              <a:t>2018-07-05</a:t>
             </a:fld>
             <a:endParaRPr lang="en-US"/>
           </a:p>
@@ -479,13 +488,7 @@
       </p:grpSpPr>
       <p:sp>
         <p:nvSpPr>
-          <p:cNvPr id="2" name="Title 1">
-            <a:extLst>
-              <a:ext uri="{FF2B5EF4-FFF2-40B4-BE49-F238E27FC236}">
-                <a16:creationId xmlns:a16="http://schemas.microsoft.com/office/drawing/2014/main" id="{881E7382-17C9-4AB9-AF73-FC66118E0A65}"/>
-              </a:ext>
-            </a:extLst>
-          </p:cNvPr>
+          <p:cNvPr id="2" name="Title 1"/>
           <p:cNvSpPr>
             <a:spLocks noGrp="1"/>
           </p:cNvSpPr>
@@ -511,18 +514,13 @@
               <a:rPr lang="en-US"/>
               <a:t>Click to edit Master title style</a:t>
             </a:r>
-          </a:p>
-        </p:txBody>
-      </p:sp>
-      <p:sp>
-        <p:nvSpPr>
-          <p:cNvPr id="3" name="Subtitle 2">
-            <a:extLst>
-              <a:ext uri="{FF2B5EF4-FFF2-40B4-BE49-F238E27FC236}">
-                <a16:creationId xmlns:a16="http://schemas.microsoft.com/office/drawing/2014/main" id="{3ADC33BD-148C-4C28-B58D-11F221420B80}"/>
-              </a:ext>
-            </a:extLst>
-          </p:cNvPr>
+            <a:endParaRPr lang="en-US" dirty="0"/>
+          </a:p>
+        </p:txBody>
+      </p:sp>
+      <p:sp>
+        <p:nvSpPr>
+          <p:cNvPr id="3" name="Subtitle 2"/>
           <p:cNvSpPr>
             <a:spLocks noGrp="1"/>
           </p:cNvSpPr>
@@ -581,18 +579,13 @@
               <a:rPr lang="en-US"/>
               <a:t>Click to edit Master subtitle style</a:t>
             </a:r>
-          </a:p>
-        </p:txBody>
-      </p:sp>
-      <p:sp>
-        <p:nvSpPr>
-          <p:cNvPr id="4" name="Date Placeholder 3">
-            <a:extLst>
-              <a:ext uri="{FF2B5EF4-FFF2-40B4-BE49-F238E27FC236}">
-                <a16:creationId xmlns:a16="http://schemas.microsoft.com/office/drawing/2014/main" id="{0696E69D-EB9A-42D5-AB97-768746439B54}"/>
-              </a:ext>
-            </a:extLst>
-          </p:cNvPr>
+            <a:endParaRPr lang="en-US" dirty="0"/>
+          </a:p>
+        </p:txBody>
+      </p:sp>
+      <p:sp>
+        <p:nvSpPr>
+          <p:cNvPr id="4" name="Date Placeholder 3"/>
           <p:cNvSpPr>
             <a:spLocks noGrp="1"/>
           </p:cNvSpPr>
@@ -607,7 +600,7 @@
           <a:p>
             <a:fld id="{3B310F8D-941A-4290-9AD4-9E0E1359B495}" type="datetime1">
               <a:rPr lang="en-US" smtClean="0"/>
-              <a:t>6/15/2018</a:t>
+              <a:t>2018-07-05</a:t>
             </a:fld>
             <a:endParaRPr lang="en-US"/>
           </a:p>
@@ -615,13 +608,7 @@
       </p:sp>
       <p:sp>
         <p:nvSpPr>
-          <p:cNvPr id="5" name="Footer Placeholder 4">
-            <a:extLst>
-              <a:ext uri="{FF2B5EF4-FFF2-40B4-BE49-F238E27FC236}">
-                <a16:creationId xmlns:a16="http://schemas.microsoft.com/office/drawing/2014/main" id="{19BE253D-450C-43DF-BE09-1C31DFF886A0}"/>
-              </a:ext>
-            </a:extLst>
-          </p:cNvPr>
+          <p:cNvPr id="5" name="Footer Placeholder 4"/>
           <p:cNvSpPr>
             <a:spLocks noGrp="1"/>
           </p:cNvSpPr>
@@ -640,13 +627,7 @@
       </p:sp>
       <p:sp>
         <p:nvSpPr>
-          <p:cNvPr id="6" name="Slide Number Placeholder 5">
-            <a:extLst>
-              <a:ext uri="{FF2B5EF4-FFF2-40B4-BE49-F238E27FC236}">
-                <a16:creationId xmlns:a16="http://schemas.microsoft.com/office/drawing/2014/main" id="{268814A7-378B-4BA3-A7D0-11578E389324}"/>
-              </a:ext>
-            </a:extLst>
-          </p:cNvPr>
+          <p:cNvPr id="6" name="Slide Number Placeholder 5"/>
           <p:cNvSpPr>
             <a:spLocks noGrp="1"/>
           </p:cNvSpPr>
@@ -670,7 +651,7 @@
     </p:spTree>
     <p:extLst>
       <p:ext uri="{BB962C8B-B14F-4D97-AF65-F5344CB8AC3E}">
-        <p14:creationId xmlns:p14="http://schemas.microsoft.com/office/powerpoint/2010/main" val="4286950034"/>
+        <p14:creationId xmlns:p14="http://schemas.microsoft.com/office/powerpoint/2010/main" val="1149902589"/>
       </p:ext>
     </p:extLst>
   </p:cSld>
@@ -699,13 +680,7 @@
       </p:grpSpPr>
       <p:sp>
         <p:nvSpPr>
-          <p:cNvPr id="2" name="Title 1">
-            <a:extLst>
-              <a:ext uri="{FF2B5EF4-FFF2-40B4-BE49-F238E27FC236}">
-                <a16:creationId xmlns:a16="http://schemas.microsoft.com/office/drawing/2014/main" id="{1AB6B0B5-92A5-4109-BC15-896CA719B04A}"/>
-              </a:ext>
-            </a:extLst>
-          </p:cNvPr>
+          <p:cNvPr id="2" name="Title 1"/>
           <p:cNvSpPr>
             <a:spLocks noGrp="1"/>
           </p:cNvSpPr>
@@ -722,18 +697,13 @@
               <a:rPr lang="en-US"/>
               <a:t>Click to edit Master title style</a:t>
             </a:r>
-          </a:p>
-        </p:txBody>
-      </p:sp>
-      <p:sp>
-        <p:nvSpPr>
-          <p:cNvPr id="3" name="Vertical Text Placeholder 2">
-            <a:extLst>
-              <a:ext uri="{FF2B5EF4-FFF2-40B4-BE49-F238E27FC236}">
-                <a16:creationId xmlns:a16="http://schemas.microsoft.com/office/drawing/2014/main" id="{82D367EB-11B6-418B-81DE-B72C908D985D}"/>
-              </a:ext>
-            </a:extLst>
-          </p:cNvPr>
+            <a:endParaRPr lang="en-US" dirty="0"/>
+          </a:p>
+        </p:txBody>
+      </p:sp>
+      <p:sp>
+        <p:nvSpPr>
+          <p:cNvPr id="3" name="Vertical Text Placeholder 2"/>
           <p:cNvSpPr>
             <a:spLocks noGrp="1"/>
           </p:cNvSpPr>
@@ -779,18 +749,13 @@
               <a:rPr lang="en-US"/>
               <a:t>Fifth level</a:t>
             </a:r>
-          </a:p>
-        </p:txBody>
-      </p:sp>
-      <p:sp>
-        <p:nvSpPr>
-          <p:cNvPr id="4" name="Date Placeholder 3">
-            <a:extLst>
-              <a:ext uri="{FF2B5EF4-FFF2-40B4-BE49-F238E27FC236}">
-                <a16:creationId xmlns:a16="http://schemas.microsoft.com/office/drawing/2014/main" id="{6E49B0BD-1732-4B22-B99B-DCC3A0D2E4D7}"/>
-              </a:ext>
-            </a:extLst>
-          </p:cNvPr>
+            <a:endParaRPr lang="en-US" dirty="0"/>
+          </a:p>
+        </p:txBody>
+      </p:sp>
+      <p:sp>
+        <p:nvSpPr>
+          <p:cNvPr id="4" name="Date Placeholder 3"/>
           <p:cNvSpPr>
             <a:spLocks noGrp="1"/>
           </p:cNvSpPr>
@@ -805,7 +770,7 @@
           <a:p>
             <a:fld id="{7304F7C5-445A-495D-9E4B-185EF9ECC1BC}" type="datetime1">
               <a:rPr lang="en-US" smtClean="0"/>
-              <a:t>6/15/2018</a:t>
+              <a:t>2018-07-05</a:t>
             </a:fld>
             <a:endParaRPr lang="en-US"/>
           </a:p>
@@ -813,13 +778,7 @@
       </p:sp>
       <p:sp>
         <p:nvSpPr>
-          <p:cNvPr id="5" name="Footer Placeholder 4">
-            <a:extLst>
-              <a:ext uri="{FF2B5EF4-FFF2-40B4-BE49-F238E27FC236}">
-                <a16:creationId xmlns:a16="http://schemas.microsoft.com/office/drawing/2014/main" id="{89EB581A-270F-4065-B0AF-684DB13532B8}"/>
-              </a:ext>
-            </a:extLst>
-          </p:cNvPr>
+          <p:cNvPr id="5" name="Footer Placeholder 4"/>
           <p:cNvSpPr>
             <a:spLocks noGrp="1"/>
           </p:cNvSpPr>
@@ -838,13 +797,7 @@
       </p:sp>
       <p:sp>
         <p:nvSpPr>
-          <p:cNvPr id="6" name="Slide Number Placeholder 5">
-            <a:extLst>
-              <a:ext uri="{FF2B5EF4-FFF2-40B4-BE49-F238E27FC236}">
-                <a16:creationId xmlns:a16="http://schemas.microsoft.com/office/drawing/2014/main" id="{2A899B52-A197-48B4-A671-5BAB1AE8FA6B}"/>
-              </a:ext>
-            </a:extLst>
-          </p:cNvPr>
+          <p:cNvPr id="6" name="Slide Number Placeholder 5"/>
           <p:cNvSpPr>
             <a:spLocks noGrp="1"/>
           </p:cNvSpPr>
@@ -868,7 +821,7 @@
     </p:spTree>
     <p:extLst>
       <p:ext uri="{BB962C8B-B14F-4D97-AF65-F5344CB8AC3E}">
-        <p14:creationId xmlns:p14="http://schemas.microsoft.com/office/powerpoint/2010/main" val="1119702053"/>
+        <p14:creationId xmlns:p14="http://schemas.microsoft.com/office/powerpoint/2010/main" val="3603251102"/>
       </p:ext>
     </p:extLst>
   </p:cSld>
@@ -897,13 +850,7 @@
       </p:grpSpPr>
       <p:sp>
         <p:nvSpPr>
-          <p:cNvPr id="2" name="Vertical Title 1">
-            <a:extLst>
-              <a:ext uri="{FF2B5EF4-FFF2-40B4-BE49-F238E27FC236}">
-                <a16:creationId xmlns:a16="http://schemas.microsoft.com/office/drawing/2014/main" id="{C8877CDE-79CC-4A26-A448-C358C5A2E75A}"/>
-              </a:ext>
-            </a:extLst>
-          </p:cNvPr>
+          <p:cNvPr id="2" name="Vertical Title 1"/>
           <p:cNvSpPr>
             <a:spLocks noGrp="1"/>
           </p:cNvSpPr>
@@ -925,18 +872,13 @@
               <a:rPr lang="en-US"/>
               <a:t>Click to edit Master title style</a:t>
             </a:r>
-          </a:p>
-        </p:txBody>
-      </p:sp>
-      <p:sp>
-        <p:nvSpPr>
-          <p:cNvPr id="3" name="Vertical Text Placeholder 2">
-            <a:extLst>
-              <a:ext uri="{FF2B5EF4-FFF2-40B4-BE49-F238E27FC236}">
-                <a16:creationId xmlns:a16="http://schemas.microsoft.com/office/drawing/2014/main" id="{2165BC21-9830-48A2-8849-51E6F32B64A5}"/>
-              </a:ext>
-            </a:extLst>
-          </p:cNvPr>
+            <a:endParaRPr lang="en-US" dirty="0"/>
+          </a:p>
+        </p:txBody>
+      </p:sp>
+      <p:sp>
+        <p:nvSpPr>
+          <p:cNvPr id="3" name="Vertical Text Placeholder 2"/>
           <p:cNvSpPr>
             <a:spLocks noGrp="1"/>
           </p:cNvSpPr>
@@ -987,18 +929,13 @@
               <a:rPr lang="en-US"/>
               <a:t>Fifth level</a:t>
             </a:r>
-          </a:p>
-        </p:txBody>
-      </p:sp>
-      <p:sp>
-        <p:nvSpPr>
-          <p:cNvPr id="4" name="Date Placeholder 3">
-            <a:extLst>
-              <a:ext uri="{FF2B5EF4-FFF2-40B4-BE49-F238E27FC236}">
-                <a16:creationId xmlns:a16="http://schemas.microsoft.com/office/drawing/2014/main" id="{97DD1243-A059-44E2-B502-E1A9C700DD0D}"/>
-              </a:ext>
-            </a:extLst>
-          </p:cNvPr>
+            <a:endParaRPr lang="en-US" dirty="0"/>
+          </a:p>
+        </p:txBody>
+      </p:sp>
+      <p:sp>
+        <p:nvSpPr>
+          <p:cNvPr id="4" name="Date Placeholder 3"/>
           <p:cNvSpPr>
             <a:spLocks noGrp="1"/>
           </p:cNvSpPr>
@@ -1013,7 +950,7 @@
           <a:p>
             <a:fld id="{D2CFDD0B-9353-4330-A178-6998BACFC81F}" type="datetime1">
               <a:rPr lang="en-US" smtClean="0"/>
-              <a:t>6/15/2018</a:t>
+              <a:t>2018-07-05</a:t>
             </a:fld>
             <a:endParaRPr lang="en-US"/>
           </a:p>
@@ -1021,13 +958,7 @@
       </p:sp>
       <p:sp>
         <p:nvSpPr>
-          <p:cNvPr id="5" name="Footer Placeholder 4">
-            <a:extLst>
-              <a:ext uri="{FF2B5EF4-FFF2-40B4-BE49-F238E27FC236}">
-                <a16:creationId xmlns:a16="http://schemas.microsoft.com/office/drawing/2014/main" id="{76037D5A-FDA9-436D-892B-82481629E4C3}"/>
-              </a:ext>
-            </a:extLst>
-          </p:cNvPr>
+          <p:cNvPr id="5" name="Footer Placeholder 4"/>
           <p:cNvSpPr>
             <a:spLocks noGrp="1"/>
           </p:cNvSpPr>
@@ -1046,13 +977,7 @@
       </p:sp>
       <p:sp>
         <p:nvSpPr>
-          <p:cNvPr id="6" name="Slide Number Placeholder 5">
-            <a:extLst>
-              <a:ext uri="{FF2B5EF4-FFF2-40B4-BE49-F238E27FC236}">
-                <a16:creationId xmlns:a16="http://schemas.microsoft.com/office/drawing/2014/main" id="{38092E0B-65B0-4994-8A47-FBE64978986E}"/>
-              </a:ext>
-            </a:extLst>
-          </p:cNvPr>
+          <p:cNvPr id="6" name="Slide Number Placeholder 5"/>
           <p:cNvSpPr>
             <a:spLocks noGrp="1"/>
           </p:cNvSpPr>
@@ -1076,7 +1001,7 @@
     </p:spTree>
     <p:extLst>
       <p:ext uri="{BB962C8B-B14F-4D97-AF65-F5344CB8AC3E}">
-        <p14:creationId xmlns:p14="http://schemas.microsoft.com/office/powerpoint/2010/main" val="2292855774"/>
+        <p14:creationId xmlns:p14="http://schemas.microsoft.com/office/powerpoint/2010/main" val="3166032235"/>
       </p:ext>
     </p:extLst>
   </p:cSld>
@@ -1105,13 +1030,7 @@
       </p:grpSpPr>
       <p:sp>
         <p:nvSpPr>
-          <p:cNvPr id="2" name="Title 1">
-            <a:extLst>
-              <a:ext uri="{FF2B5EF4-FFF2-40B4-BE49-F238E27FC236}">
-                <a16:creationId xmlns:a16="http://schemas.microsoft.com/office/drawing/2014/main" id="{38F64B57-BE00-4B82-BDF1-62646FF47585}"/>
-              </a:ext>
-            </a:extLst>
-          </p:cNvPr>
+          <p:cNvPr id="2" name="Title 1"/>
           <p:cNvSpPr>
             <a:spLocks noGrp="1"/>
           </p:cNvSpPr>
@@ -1128,18 +1047,13 @@
               <a:rPr lang="en-US"/>
               <a:t>Click to edit Master title style</a:t>
             </a:r>
-          </a:p>
-        </p:txBody>
-      </p:sp>
-      <p:sp>
-        <p:nvSpPr>
-          <p:cNvPr id="3" name="Content Placeholder 2">
-            <a:extLst>
-              <a:ext uri="{FF2B5EF4-FFF2-40B4-BE49-F238E27FC236}">
-                <a16:creationId xmlns:a16="http://schemas.microsoft.com/office/drawing/2014/main" id="{3AA3CABC-1CE3-4BE8-9099-C5BB9681821F}"/>
-              </a:ext>
-            </a:extLst>
-          </p:cNvPr>
+            <a:endParaRPr lang="en-US" dirty="0"/>
+          </a:p>
+        </p:txBody>
+      </p:sp>
+      <p:sp>
+        <p:nvSpPr>
+          <p:cNvPr id="3" name="Content Placeholder 2"/>
           <p:cNvSpPr>
             <a:spLocks noGrp="1"/>
           </p:cNvSpPr>
@@ -1185,18 +1099,13 @@
               <a:rPr lang="en-US"/>
               <a:t>Fifth level</a:t>
             </a:r>
-          </a:p>
-        </p:txBody>
-      </p:sp>
-      <p:sp>
-        <p:nvSpPr>
-          <p:cNvPr id="4" name="Date Placeholder 3">
-            <a:extLst>
-              <a:ext uri="{FF2B5EF4-FFF2-40B4-BE49-F238E27FC236}">
-                <a16:creationId xmlns:a16="http://schemas.microsoft.com/office/drawing/2014/main" id="{F272C54D-690B-4F5E-98FE-084E983A84E4}"/>
-              </a:ext>
-            </a:extLst>
-          </p:cNvPr>
+            <a:endParaRPr lang="en-US" dirty="0"/>
+          </a:p>
+        </p:txBody>
+      </p:sp>
+      <p:sp>
+        <p:nvSpPr>
+          <p:cNvPr id="4" name="Date Placeholder 3"/>
           <p:cNvSpPr>
             <a:spLocks noGrp="1"/>
           </p:cNvSpPr>
@@ -1211,7 +1120,7 @@
           <a:p>
             <a:fld id="{7F9E3F0D-B30C-4255-ABA0-8917B8CB3B8F}" type="datetime1">
               <a:rPr lang="en-US" smtClean="0"/>
-              <a:t>6/15/2018</a:t>
+              <a:t>2018-07-05</a:t>
             </a:fld>
             <a:endParaRPr lang="en-US"/>
           </a:p>
@@ -1219,13 +1128,7 @@
       </p:sp>
       <p:sp>
         <p:nvSpPr>
-          <p:cNvPr id="5" name="Footer Placeholder 4">
-            <a:extLst>
-              <a:ext uri="{FF2B5EF4-FFF2-40B4-BE49-F238E27FC236}">
-                <a16:creationId xmlns:a16="http://schemas.microsoft.com/office/drawing/2014/main" id="{2B57281C-B066-4FB9-A06F-768910B877D1}"/>
-              </a:ext>
-            </a:extLst>
-          </p:cNvPr>
+          <p:cNvPr id="5" name="Footer Placeholder 4"/>
           <p:cNvSpPr>
             <a:spLocks noGrp="1"/>
           </p:cNvSpPr>
@@ -1244,13 +1147,7 @@
       </p:sp>
       <p:sp>
         <p:nvSpPr>
-          <p:cNvPr id="6" name="Slide Number Placeholder 5">
-            <a:extLst>
-              <a:ext uri="{FF2B5EF4-FFF2-40B4-BE49-F238E27FC236}">
-                <a16:creationId xmlns:a16="http://schemas.microsoft.com/office/drawing/2014/main" id="{854D538D-8761-40A4-B370-4C3910F10DB3}"/>
-              </a:ext>
-            </a:extLst>
-          </p:cNvPr>
+          <p:cNvPr id="6" name="Slide Number Placeholder 5"/>
           <p:cNvSpPr>
             <a:spLocks noGrp="1"/>
           </p:cNvSpPr>
@@ -1274,7 +1171,7 @@
     </p:spTree>
     <p:extLst>
       <p:ext uri="{BB962C8B-B14F-4D97-AF65-F5344CB8AC3E}">
-        <p14:creationId xmlns:p14="http://schemas.microsoft.com/office/powerpoint/2010/main" val="2054647939"/>
+        <p14:creationId xmlns:p14="http://schemas.microsoft.com/office/powerpoint/2010/main" val="1115261028"/>
       </p:ext>
     </p:extLst>
   </p:cSld>
@@ -1303,13 +1200,7 @@
       </p:grpSpPr>
       <p:sp>
         <p:nvSpPr>
-          <p:cNvPr id="2" name="Title 1">
-            <a:extLst>
-              <a:ext uri="{FF2B5EF4-FFF2-40B4-BE49-F238E27FC236}">
-                <a16:creationId xmlns:a16="http://schemas.microsoft.com/office/drawing/2014/main" id="{0198CA23-0DC5-4463-A162-948B3983950E}"/>
-              </a:ext>
-            </a:extLst>
-          </p:cNvPr>
+          <p:cNvPr id="2" name="Title 1"/>
           <p:cNvSpPr>
             <a:spLocks noGrp="1"/>
           </p:cNvSpPr>
@@ -1335,18 +1226,13 @@
               <a:rPr lang="en-US"/>
               <a:t>Click to edit Master title style</a:t>
             </a:r>
-          </a:p>
-        </p:txBody>
-      </p:sp>
-      <p:sp>
-        <p:nvSpPr>
-          <p:cNvPr id="3" name="Text Placeholder 2">
-            <a:extLst>
-              <a:ext uri="{FF2B5EF4-FFF2-40B4-BE49-F238E27FC236}">
-                <a16:creationId xmlns:a16="http://schemas.microsoft.com/office/drawing/2014/main" id="{0D607401-CEEA-4C62-BFD7-CEA67D7FFC0A}"/>
-              </a:ext>
-            </a:extLst>
-          </p:cNvPr>
+            <a:endParaRPr lang="en-US" dirty="0"/>
+          </a:p>
+        </p:txBody>
+      </p:sp>
+      <p:sp>
+        <p:nvSpPr>
+          <p:cNvPr id="3" name="Text Placeholder 2"/>
           <p:cNvSpPr>
             <a:spLocks noGrp="1"/>
           </p:cNvSpPr>
@@ -1465,13 +1351,7 @@
       </p:sp>
       <p:sp>
         <p:nvSpPr>
-          <p:cNvPr id="4" name="Date Placeholder 3">
-            <a:extLst>
-              <a:ext uri="{FF2B5EF4-FFF2-40B4-BE49-F238E27FC236}">
-                <a16:creationId xmlns:a16="http://schemas.microsoft.com/office/drawing/2014/main" id="{F109160C-C58D-4028-A573-AE62A8CB9905}"/>
-              </a:ext>
-            </a:extLst>
-          </p:cNvPr>
+          <p:cNvPr id="4" name="Date Placeholder 3"/>
           <p:cNvSpPr>
             <a:spLocks noGrp="1"/>
           </p:cNvSpPr>
@@ -1486,7 +1366,7 @@
           <a:p>
             <a:fld id="{BDC50106-11C7-4743-A268-352326C24D1C}" type="datetime1">
               <a:rPr lang="en-US" smtClean="0"/>
-              <a:t>6/15/2018</a:t>
+              <a:t>2018-07-05</a:t>
             </a:fld>
             <a:endParaRPr lang="en-US"/>
           </a:p>
@@ -1494,13 +1374,7 @@
       </p:sp>
       <p:sp>
         <p:nvSpPr>
-          <p:cNvPr id="5" name="Footer Placeholder 4">
-            <a:extLst>
-              <a:ext uri="{FF2B5EF4-FFF2-40B4-BE49-F238E27FC236}">
-                <a16:creationId xmlns:a16="http://schemas.microsoft.com/office/drawing/2014/main" id="{4C6792CC-63F5-40D8-A1EF-1F829F8D2668}"/>
-              </a:ext>
-            </a:extLst>
-          </p:cNvPr>
+          <p:cNvPr id="5" name="Footer Placeholder 4"/>
           <p:cNvSpPr>
             <a:spLocks noGrp="1"/>
           </p:cNvSpPr>
@@ -1519,13 +1393,7 @@
       </p:sp>
       <p:sp>
         <p:nvSpPr>
-          <p:cNvPr id="6" name="Slide Number Placeholder 5">
-            <a:extLst>
-              <a:ext uri="{FF2B5EF4-FFF2-40B4-BE49-F238E27FC236}">
-                <a16:creationId xmlns:a16="http://schemas.microsoft.com/office/drawing/2014/main" id="{35244B82-5184-416F-899A-B43AD92EF3F6}"/>
-              </a:ext>
-            </a:extLst>
-          </p:cNvPr>
+          <p:cNvPr id="6" name="Slide Number Placeholder 5"/>
           <p:cNvSpPr>
             <a:spLocks noGrp="1"/>
           </p:cNvSpPr>
@@ -1549,7 +1417,7 @@
     </p:spTree>
     <p:extLst>
       <p:ext uri="{BB962C8B-B14F-4D97-AF65-F5344CB8AC3E}">
-        <p14:creationId xmlns:p14="http://schemas.microsoft.com/office/powerpoint/2010/main" val="2478157891"/>
+        <p14:creationId xmlns:p14="http://schemas.microsoft.com/office/powerpoint/2010/main" val="191745767"/>
       </p:ext>
     </p:extLst>
   </p:cSld>
@@ -1578,13 +1446,7 @@
       </p:grpSpPr>
       <p:sp>
         <p:nvSpPr>
-          <p:cNvPr id="2" name="Title 1">
-            <a:extLst>
-              <a:ext uri="{FF2B5EF4-FFF2-40B4-BE49-F238E27FC236}">
-                <a16:creationId xmlns:a16="http://schemas.microsoft.com/office/drawing/2014/main" id="{99FD9940-41D9-4320-AF05-80835D9D7A1C}"/>
-              </a:ext>
-            </a:extLst>
-          </p:cNvPr>
+          <p:cNvPr id="2" name="Title 1"/>
           <p:cNvSpPr>
             <a:spLocks noGrp="1"/>
           </p:cNvSpPr>
@@ -1601,18 +1463,13 @@
               <a:rPr lang="en-US"/>
               <a:t>Click to edit Master title style</a:t>
             </a:r>
-          </a:p>
-        </p:txBody>
-      </p:sp>
-      <p:sp>
-        <p:nvSpPr>
-          <p:cNvPr id="3" name="Content Placeholder 2">
-            <a:extLst>
-              <a:ext uri="{FF2B5EF4-FFF2-40B4-BE49-F238E27FC236}">
-                <a16:creationId xmlns:a16="http://schemas.microsoft.com/office/drawing/2014/main" id="{0277B11D-275B-4346-8025-7CEC78F6BB93}"/>
-              </a:ext>
-            </a:extLst>
-          </p:cNvPr>
+            <a:endParaRPr lang="en-US" dirty="0"/>
+          </a:p>
+        </p:txBody>
+      </p:sp>
+      <p:sp>
+        <p:nvSpPr>
+          <p:cNvPr id="3" name="Content Placeholder 2"/>
           <p:cNvSpPr>
             <a:spLocks noGrp="1"/>
           </p:cNvSpPr>
@@ -1663,18 +1520,13 @@
               <a:rPr lang="en-US"/>
               <a:t>Fifth level</a:t>
             </a:r>
-          </a:p>
-        </p:txBody>
-      </p:sp>
-      <p:sp>
-        <p:nvSpPr>
-          <p:cNvPr id="4" name="Content Placeholder 3">
-            <a:extLst>
-              <a:ext uri="{FF2B5EF4-FFF2-40B4-BE49-F238E27FC236}">
-                <a16:creationId xmlns:a16="http://schemas.microsoft.com/office/drawing/2014/main" id="{60AE1AEF-D1AC-4DFA-BF48-35356C9C462A}"/>
-              </a:ext>
-            </a:extLst>
-          </p:cNvPr>
+            <a:endParaRPr lang="en-US" dirty="0"/>
+          </a:p>
+        </p:txBody>
+      </p:sp>
+      <p:sp>
+        <p:nvSpPr>
+          <p:cNvPr id="4" name="Content Placeholder 3"/>
           <p:cNvSpPr>
             <a:spLocks noGrp="1"/>
           </p:cNvSpPr>
@@ -1725,18 +1577,13 @@
               <a:rPr lang="en-US"/>
               <a:t>Fifth level</a:t>
             </a:r>
-          </a:p>
-        </p:txBody>
-      </p:sp>
-      <p:sp>
-        <p:nvSpPr>
-          <p:cNvPr id="5" name="Date Placeholder 4">
-            <a:extLst>
-              <a:ext uri="{FF2B5EF4-FFF2-40B4-BE49-F238E27FC236}">
-                <a16:creationId xmlns:a16="http://schemas.microsoft.com/office/drawing/2014/main" id="{CB448629-64FE-481B-9D0B-F8E2633052F1}"/>
-              </a:ext>
-            </a:extLst>
-          </p:cNvPr>
+            <a:endParaRPr lang="en-US" dirty="0"/>
+          </a:p>
+        </p:txBody>
+      </p:sp>
+      <p:sp>
+        <p:nvSpPr>
+          <p:cNvPr id="5" name="Date Placeholder 4"/>
           <p:cNvSpPr>
             <a:spLocks noGrp="1"/>
           </p:cNvSpPr>
@@ -1751,7 +1598,7 @@
           <a:p>
             <a:fld id="{788D2460-8893-4237-87EC-6D23E813631B}" type="datetime1">
               <a:rPr lang="en-US" smtClean="0"/>
-              <a:t>6/15/2018</a:t>
+              <a:t>2018-07-05</a:t>
             </a:fld>
             <a:endParaRPr lang="en-US"/>
           </a:p>
@@ -1759,13 +1606,7 @@
       </p:sp>
       <p:sp>
         <p:nvSpPr>
-          <p:cNvPr id="6" name="Footer Placeholder 5">
-            <a:extLst>
-              <a:ext uri="{FF2B5EF4-FFF2-40B4-BE49-F238E27FC236}">
-                <a16:creationId xmlns:a16="http://schemas.microsoft.com/office/drawing/2014/main" id="{0138250B-98EE-4659-A55D-B2A47448A9CB}"/>
-              </a:ext>
-            </a:extLst>
-          </p:cNvPr>
+          <p:cNvPr id="6" name="Footer Placeholder 5"/>
           <p:cNvSpPr>
             <a:spLocks noGrp="1"/>
           </p:cNvSpPr>
@@ -1784,13 +1625,7 @@
       </p:sp>
       <p:sp>
         <p:nvSpPr>
-          <p:cNvPr id="7" name="Slide Number Placeholder 6">
-            <a:extLst>
-              <a:ext uri="{FF2B5EF4-FFF2-40B4-BE49-F238E27FC236}">
-                <a16:creationId xmlns:a16="http://schemas.microsoft.com/office/drawing/2014/main" id="{447A11AC-21B1-42E5-93A4-06F08406DE6D}"/>
-              </a:ext>
-            </a:extLst>
-          </p:cNvPr>
+          <p:cNvPr id="7" name="Slide Number Placeholder 6"/>
           <p:cNvSpPr>
             <a:spLocks noGrp="1"/>
           </p:cNvSpPr>
@@ -1814,7 +1649,7 @@
     </p:spTree>
     <p:extLst>
       <p:ext uri="{BB962C8B-B14F-4D97-AF65-F5344CB8AC3E}">
-        <p14:creationId xmlns:p14="http://schemas.microsoft.com/office/powerpoint/2010/main" val="1354459105"/>
+        <p14:creationId xmlns:p14="http://schemas.microsoft.com/office/powerpoint/2010/main" val="3720659000"/>
       </p:ext>
     </p:extLst>
   </p:cSld>
@@ -1843,13 +1678,7 @@
       </p:grpSpPr>
       <p:sp>
         <p:nvSpPr>
-          <p:cNvPr id="2" name="Title 1">
-            <a:extLst>
-              <a:ext uri="{FF2B5EF4-FFF2-40B4-BE49-F238E27FC236}">
-                <a16:creationId xmlns:a16="http://schemas.microsoft.com/office/drawing/2014/main" id="{A511DAD8-EBB9-4022-B5BD-ADF310E6DB51}"/>
-              </a:ext>
-            </a:extLst>
-          </p:cNvPr>
+          <p:cNvPr id="2" name="Title 1"/>
           <p:cNvSpPr>
             <a:spLocks noGrp="1"/>
           </p:cNvSpPr>
@@ -1871,18 +1700,13 @@
               <a:rPr lang="en-US"/>
               <a:t>Click to edit Master title style</a:t>
             </a:r>
-          </a:p>
-        </p:txBody>
-      </p:sp>
-      <p:sp>
-        <p:nvSpPr>
-          <p:cNvPr id="3" name="Text Placeholder 2">
-            <a:extLst>
-              <a:ext uri="{FF2B5EF4-FFF2-40B4-BE49-F238E27FC236}">
-                <a16:creationId xmlns:a16="http://schemas.microsoft.com/office/drawing/2014/main" id="{70601F25-6C9E-43EC-922C-95CE6455B469}"/>
-              </a:ext>
-            </a:extLst>
-          </p:cNvPr>
+            <a:endParaRPr lang="en-US" dirty="0"/>
+          </a:p>
+        </p:txBody>
+      </p:sp>
+      <p:sp>
+        <p:nvSpPr>
+          <p:cNvPr id="3" name="Text Placeholder 2"/>
           <p:cNvSpPr>
             <a:spLocks noGrp="1"/>
           </p:cNvSpPr>
@@ -1947,13 +1771,7 @@
       </p:sp>
       <p:sp>
         <p:nvSpPr>
-          <p:cNvPr id="4" name="Content Placeholder 3">
-            <a:extLst>
-              <a:ext uri="{FF2B5EF4-FFF2-40B4-BE49-F238E27FC236}">
-                <a16:creationId xmlns:a16="http://schemas.microsoft.com/office/drawing/2014/main" id="{C530A383-AEEE-455B-953E-104A579BE710}"/>
-              </a:ext>
-            </a:extLst>
-          </p:cNvPr>
+          <p:cNvPr id="4" name="Content Placeholder 3"/>
           <p:cNvSpPr>
             <a:spLocks noGrp="1"/>
           </p:cNvSpPr>
@@ -2004,18 +1822,13 @@
               <a:rPr lang="en-US"/>
               <a:t>Fifth level</a:t>
             </a:r>
-          </a:p>
-        </p:txBody>
-      </p:sp>
-      <p:sp>
-        <p:nvSpPr>
-          <p:cNvPr id="5" name="Text Placeholder 4">
-            <a:extLst>
-              <a:ext uri="{FF2B5EF4-FFF2-40B4-BE49-F238E27FC236}">
-                <a16:creationId xmlns:a16="http://schemas.microsoft.com/office/drawing/2014/main" id="{2E990271-B4C6-4E22-A041-C882DBDB808C}"/>
-              </a:ext>
-            </a:extLst>
-          </p:cNvPr>
+            <a:endParaRPr lang="en-US" dirty="0"/>
+          </a:p>
+        </p:txBody>
+      </p:sp>
+      <p:sp>
+        <p:nvSpPr>
+          <p:cNvPr id="5" name="Text Placeholder 4"/>
           <p:cNvSpPr>
             <a:spLocks noGrp="1"/>
           </p:cNvSpPr>
@@ -2080,13 +1893,7 @@
       </p:sp>
       <p:sp>
         <p:nvSpPr>
-          <p:cNvPr id="6" name="Content Placeholder 5">
-            <a:extLst>
-              <a:ext uri="{FF2B5EF4-FFF2-40B4-BE49-F238E27FC236}">
-                <a16:creationId xmlns:a16="http://schemas.microsoft.com/office/drawing/2014/main" id="{219B21E2-5095-4822-BD14-B6782B50A367}"/>
-              </a:ext>
-            </a:extLst>
-          </p:cNvPr>
+          <p:cNvPr id="6" name="Content Placeholder 5"/>
           <p:cNvSpPr>
             <a:spLocks noGrp="1"/>
           </p:cNvSpPr>
@@ -2137,18 +1944,13 @@
               <a:rPr lang="en-US"/>
               <a:t>Fifth level</a:t>
             </a:r>
-          </a:p>
-        </p:txBody>
-      </p:sp>
-      <p:sp>
-        <p:nvSpPr>
-          <p:cNvPr id="7" name="Date Placeholder 6">
-            <a:extLst>
-              <a:ext uri="{FF2B5EF4-FFF2-40B4-BE49-F238E27FC236}">
-                <a16:creationId xmlns:a16="http://schemas.microsoft.com/office/drawing/2014/main" id="{BFA16EAE-3DD4-43C4-804F-2BC779A1393F}"/>
-              </a:ext>
-            </a:extLst>
-          </p:cNvPr>
+            <a:endParaRPr lang="en-US" dirty="0"/>
+          </a:p>
+        </p:txBody>
+      </p:sp>
+      <p:sp>
+        <p:nvSpPr>
+          <p:cNvPr id="7" name="Date Placeholder 6"/>
           <p:cNvSpPr>
             <a:spLocks noGrp="1"/>
           </p:cNvSpPr>
@@ -2163,7 +1965,7 @@
           <a:p>
             <a:fld id="{27E9E99A-D479-4EDF-8C6D-90E41B7F7420}" type="datetime1">
               <a:rPr lang="en-US" smtClean="0"/>
-              <a:t>6/15/2018</a:t>
+              <a:t>2018-07-05</a:t>
             </a:fld>
             <a:endParaRPr lang="en-US"/>
           </a:p>
@@ -2171,13 +1973,7 @@
       </p:sp>
       <p:sp>
         <p:nvSpPr>
-          <p:cNvPr id="8" name="Footer Placeholder 7">
-            <a:extLst>
-              <a:ext uri="{FF2B5EF4-FFF2-40B4-BE49-F238E27FC236}">
-                <a16:creationId xmlns:a16="http://schemas.microsoft.com/office/drawing/2014/main" id="{CB3A6A34-8088-46FF-AD7E-5952DE5CEDC1}"/>
-              </a:ext>
-            </a:extLst>
-          </p:cNvPr>
+          <p:cNvPr id="8" name="Footer Placeholder 7"/>
           <p:cNvSpPr>
             <a:spLocks noGrp="1"/>
           </p:cNvSpPr>
@@ -2196,13 +1992,7 @@
       </p:sp>
       <p:sp>
         <p:nvSpPr>
-          <p:cNvPr id="9" name="Slide Number Placeholder 8">
-            <a:extLst>
-              <a:ext uri="{FF2B5EF4-FFF2-40B4-BE49-F238E27FC236}">
-                <a16:creationId xmlns:a16="http://schemas.microsoft.com/office/drawing/2014/main" id="{18DC9D39-D966-4FB3-8EA2-45F4CC7A009C}"/>
-              </a:ext>
-            </a:extLst>
-          </p:cNvPr>
+          <p:cNvPr id="9" name="Slide Number Placeholder 8"/>
           <p:cNvSpPr>
             <a:spLocks noGrp="1"/>
           </p:cNvSpPr>
@@ -2226,7 +2016,7 @@
     </p:spTree>
     <p:extLst>
       <p:ext uri="{BB962C8B-B14F-4D97-AF65-F5344CB8AC3E}">
-        <p14:creationId xmlns:p14="http://schemas.microsoft.com/office/powerpoint/2010/main" val="452372328"/>
+        <p14:creationId xmlns:p14="http://schemas.microsoft.com/office/powerpoint/2010/main" val="2807070065"/>
       </p:ext>
     </p:extLst>
   </p:cSld>
@@ -2255,13 +2045,7 @@
       </p:grpSpPr>
       <p:sp>
         <p:nvSpPr>
-          <p:cNvPr id="2" name="Title 1">
-            <a:extLst>
-              <a:ext uri="{FF2B5EF4-FFF2-40B4-BE49-F238E27FC236}">
-                <a16:creationId xmlns:a16="http://schemas.microsoft.com/office/drawing/2014/main" id="{329C4C0D-98E8-4680-9B73-957D389419D6}"/>
-              </a:ext>
-            </a:extLst>
-          </p:cNvPr>
+          <p:cNvPr id="2" name="Title 1"/>
           <p:cNvSpPr>
             <a:spLocks noGrp="1"/>
           </p:cNvSpPr>
@@ -2278,18 +2062,13 @@
               <a:rPr lang="en-US"/>
               <a:t>Click to edit Master title style</a:t>
             </a:r>
-          </a:p>
-        </p:txBody>
-      </p:sp>
-      <p:sp>
-        <p:nvSpPr>
-          <p:cNvPr id="3" name="Date Placeholder 2">
-            <a:extLst>
-              <a:ext uri="{FF2B5EF4-FFF2-40B4-BE49-F238E27FC236}">
-                <a16:creationId xmlns:a16="http://schemas.microsoft.com/office/drawing/2014/main" id="{EFBC0E4A-10AB-4ECA-B592-AFF3A32713D9}"/>
-              </a:ext>
-            </a:extLst>
-          </p:cNvPr>
+            <a:endParaRPr lang="en-US" dirty="0"/>
+          </a:p>
+        </p:txBody>
+      </p:sp>
+      <p:sp>
+        <p:nvSpPr>
+          <p:cNvPr id="3" name="Date Placeholder 2"/>
           <p:cNvSpPr>
             <a:spLocks noGrp="1"/>
           </p:cNvSpPr>
@@ -2304,7 +2083,7 @@
           <a:p>
             <a:fld id="{85451478-3410-43B1-B561-26F907204A43}" type="datetime1">
               <a:rPr lang="en-US" smtClean="0"/>
-              <a:t>6/15/2018</a:t>
+              <a:t>2018-07-05</a:t>
             </a:fld>
             <a:endParaRPr lang="en-US"/>
           </a:p>
@@ -2312,13 +2091,7 @@
       </p:sp>
       <p:sp>
         <p:nvSpPr>
-          <p:cNvPr id="4" name="Footer Placeholder 3">
-            <a:extLst>
-              <a:ext uri="{FF2B5EF4-FFF2-40B4-BE49-F238E27FC236}">
-                <a16:creationId xmlns:a16="http://schemas.microsoft.com/office/drawing/2014/main" id="{8006C509-1B11-454A-BB6D-848C4E4D0EE4}"/>
-              </a:ext>
-            </a:extLst>
-          </p:cNvPr>
+          <p:cNvPr id="4" name="Footer Placeholder 3"/>
           <p:cNvSpPr>
             <a:spLocks noGrp="1"/>
           </p:cNvSpPr>
@@ -2337,13 +2110,7 @@
       </p:sp>
       <p:sp>
         <p:nvSpPr>
-          <p:cNvPr id="5" name="Slide Number Placeholder 4">
-            <a:extLst>
-              <a:ext uri="{FF2B5EF4-FFF2-40B4-BE49-F238E27FC236}">
-                <a16:creationId xmlns:a16="http://schemas.microsoft.com/office/drawing/2014/main" id="{D54EFBB6-A95B-49EC-8EF7-CDC2B4C5AE11}"/>
-              </a:ext>
-            </a:extLst>
-          </p:cNvPr>
+          <p:cNvPr id="5" name="Slide Number Placeholder 4"/>
           <p:cNvSpPr>
             <a:spLocks noGrp="1"/>
           </p:cNvSpPr>
@@ -2367,7 +2134,7 @@
     </p:spTree>
     <p:extLst>
       <p:ext uri="{BB962C8B-B14F-4D97-AF65-F5344CB8AC3E}">
-        <p14:creationId xmlns:p14="http://schemas.microsoft.com/office/powerpoint/2010/main" val="2176545694"/>
+        <p14:creationId xmlns:p14="http://schemas.microsoft.com/office/powerpoint/2010/main" val="2853362548"/>
       </p:ext>
     </p:extLst>
   </p:cSld>
@@ -2396,13 +2163,7 @@
       </p:grpSpPr>
       <p:sp>
         <p:nvSpPr>
-          <p:cNvPr id="2" name="Date Placeholder 1">
-            <a:extLst>
-              <a:ext uri="{FF2B5EF4-FFF2-40B4-BE49-F238E27FC236}">
-                <a16:creationId xmlns:a16="http://schemas.microsoft.com/office/drawing/2014/main" id="{064EDD4C-B896-46EE-8B48-CBB24A3845C4}"/>
-              </a:ext>
-            </a:extLst>
-          </p:cNvPr>
+          <p:cNvPr id="2" name="Date Placeholder 1"/>
           <p:cNvSpPr>
             <a:spLocks noGrp="1"/>
           </p:cNvSpPr>
@@ -2417,7 +2178,7 @@
           <a:p>
             <a:fld id="{FA489C54-C8EE-4B91-B64B-6687A21D522B}" type="datetime1">
               <a:rPr lang="en-US" smtClean="0"/>
-              <a:t>6/15/2018</a:t>
+              <a:t>2018-07-05</a:t>
             </a:fld>
             <a:endParaRPr lang="en-US"/>
           </a:p>
@@ -2425,13 +2186,7 @@
       </p:sp>
       <p:sp>
         <p:nvSpPr>
-          <p:cNvPr id="3" name="Footer Placeholder 2">
-            <a:extLst>
-              <a:ext uri="{FF2B5EF4-FFF2-40B4-BE49-F238E27FC236}">
-                <a16:creationId xmlns:a16="http://schemas.microsoft.com/office/drawing/2014/main" id="{4CFEDFA6-9FF3-4334-8FD2-3F3AFB08B8B6}"/>
-              </a:ext>
-            </a:extLst>
-          </p:cNvPr>
+          <p:cNvPr id="3" name="Footer Placeholder 2"/>
           <p:cNvSpPr>
             <a:spLocks noGrp="1"/>
           </p:cNvSpPr>
@@ -2450,13 +2205,7 @@
       </p:sp>
       <p:sp>
         <p:nvSpPr>
-          <p:cNvPr id="4" name="Slide Number Placeholder 3">
-            <a:extLst>
-              <a:ext uri="{FF2B5EF4-FFF2-40B4-BE49-F238E27FC236}">
-                <a16:creationId xmlns:a16="http://schemas.microsoft.com/office/drawing/2014/main" id="{11B03D37-A489-4C52-92AD-54A9ECD957A0}"/>
-              </a:ext>
-            </a:extLst>
-          </p:cNvPr>
+          <p:cNvPr id="4" name="Slide Number Placeholder 3"/>
           <p:cNvSpPr>
             <a:spLocks noGrp="1"/>
           </p:cNvSpPr>
@@ -2480,7 +2229,7 @@
     </p:spTree>
     <p:extLst>
       <p:ext uri="{BB962C8B-B14F-4D97-AF65-F5344CB8AC3E}">
-        <p14:creationId xmlns:p14="http://schemas.microsoft.com/office/powerpoint/2010/main" val="633730101"/>
+        <p14:creationId xmlns:p14="http://schemas.microsoft.com/office/powerpoint/2010/main" val="3255761461"/>
       </p:ext>
     </p:extLst>
   </p:cSld>
@@ -2509,13 +2258,7 @@
       </p:grpSpPr>
       <p:sp>
         <p:nvSpPr>
-          <p:cNvPr id="2" name="Title 1">
-            <a:extLst>
-              <a:ext uri="{FF2B5EF4-FFF2-40B4-BE49-F238E27FC236}">
-                <a16:creationId xmlns:a16="http://schemas.microsoft.com/office/drawing/2014/main" id="{E6BC4AF7-724A-4F8B-B78A-BC1EA4343D35}"/>
-              </a:ext>
-            </a:extLst>
-          </p:cNvPr>
+          <p:cNvPr id="2" name="Title 1"/>
           <p:cNvSpPr>
             <a:spLocks noGrp="1"/>
           </p:cNvSpPr>
@@ -2541,18 +2284,13 @@
               <a:rPr lang="en-US"/>
               <a:t>Click to edit Master title style</a:t>
             </a:r>
-          </a:p>
-        </p:txBody>
-      </p:sp>
-      <p:sp>
-        <p:nvSpPr>
-          <p:cNvPr id="3" name="Content Placeholder 2">
-            <a:extLst>
-              <a:ext uri="{FF2B5EF4-FFF2-40B4-BE49-F238E27FC236}">
-                <a16:creationId xmlns:a16="http://schemas.microsoft.com/office/drawing/2014/main" id="{00E2E240-645B-4094-9D61-0428FA89964F}"/>
-              </a:ext>
-            </a:extLst>
-          </p:cNvPr>
+            <a:endParaRPr lang="en-US" dirty="0"/>
+          </a:p>
+        </p:txBody>
+      </p:sp>
+      <p:sp>
+        <p:nvSpPr>
+          <p:cNvPr id="3" name="Content Placeholder 2"/>
           <p:cNvSpPr>
             <a:spLocks noGrp="1"/>
           </p:cNvSpPr>
@@ -2631,18 +2369,13 @@
               <a:rPr lang="en-US"/>
               <a:t>Fifth level</a:t>
             </a:r>
-          </a:p>
-        </p:txBody>
-      </p:sp>
-      <p:sp>
-        <p:nvSpPr>
-          <p:cNvPr id="4" name="Text Placeholder 3">
-            <a:extLst>
-              <a:ext uri="{FF2B5EF4-FFF2-40B4-BE49-F238E27FC236}">
-                <a16:creationId xmlns:a16="http://schemas.microsoft.com/office/drawing/2014/main" id="{C3EE435C-526E-4DE6-AD9D-32A3C8C06EE9}"/>
-              </a:ext>
-            </a:extLst>
-          </p:cNvPr>
+            <a:endParaRPr lang="en-US" dirty="0"/>
+          </a:p>
+        </p:txBody>
+      </p:sp>
+      <p:sp>
+        <p:nvSpPr>
+          <p:cNvPr id="4" name="Text Placeholder 3"/>
           <p:cNvSpPr>
             <a:spLocks noGrp="1"/>
           </p:cNvSpPr>
@@ -2707,13 +2440,7 @@
       </p:sp>
       <p:sp>
         <p:nvSpPr>
-          <p:cNvPr id="5" name="Date Placeholder 4">
-            <a:extLst>
-              <a:ext uri="{FF2B5EF4-FFF2-40B4-BE49-F238E27FC236}">
-                <a16:creationId xmlns:a16="http://schemas.microsoft.com/office/drawing/2014/main" id="{54D97EB9-CEB1-465C-9B3B-CF0C5DC90959}"/>
-              </a:ext>
-            </a:extLst>
-          </p:cNvPr>
+          <p:cNvPr id="5" name="Date Placeholder 4"/>
           <p:cNvSpPr>
             <a:spLocks noGrp="1"/>
           </p:cNvSpPr>
@@ -2728,7 +2455,7 @@
           <a:p>
             <a:fld id="{40BF1821-AA5A-4F67-9395-523155C54006}" type="datetime1">
               <a:rPr lang="en-US" smtClean="0"/>
-              <a:t>6/15/2018</a:t>
+              <a:t>2018-07-05</a:t>
             </a:fld>
             <a:endParaRPr lang="en-US"/>
           </a:p>
@@ -2736,13 +2463,7 @@
       </p:sp>
       <p:sp>
         <p:nvSpPr>
-          <p:cNvPr id="6" name="Footer Placeholder 5">
-            <a:extLst>
-              <a:ext uri="{FF2B5EF4-FFF2-40B4-BE49-F238E27FC236}">
-                <a16:creationId xmlns:a16="http://schemas.microsoft.com/office/drawing/2014/main" id="{F61A028C-F54F-40F9-BA80-3624056F81C2}"/>
-              </a:ext>
-            </a:extLst>
-          </p:cNvPr>
+          <p:cNvPr id="6" name="Footer Placeholder 5"/>
           <p:cNvSpPr>
             <a:spLocks noGrp="1"/>
           </p:cNvSpPr>
@@ -2761,13 +2482,7 @@
       </p:sp>
       <p:sp>
         <p:nvSpPr>
-          <p:cNvPr id="7" name="Slide Number Placeholder 6">
-            <a:extLst>
-              <a:ext uri="{FF2B5EF4-FFF2-40B4-BE49-F238E27FC236}">
-                <a16:creationId xmlns:a16="http://schemas.microsoft.com/office/drawing/2014/main" id="{E2E1D9F4-602E-4064-82A2-A92EF09D0FFB}"/>
-              </a:ext>
-            </a:extLst>
-          </p:cNvPr>
+          <p:cNvPr id="7" name="Slide Number Placeholder 6"/>
           <p:cNvSpPr>
             <a:spLocks noGrp="1"/>
           </p:cNvSpPr>
@@ -2791,7 +2506,7 @@
     </p:spTree>
     <p:extLst>
       <p:ext uri="{BB962C8B-B14F-4D97-AF65-F5344CB8AC3E}">
-        <p14:creationId xmlns:p14="http://schemas.microsoft.com/office/powerpoint/2010/main" val="2585627411"/>
+        <p14:creationId xmlns:p14="http://schemas.microsoft.com/office/powerpoint/2010/main" val="2071273385"/>
       </p:ext>
     </p:extLst>
   </p:cSld>
@@ -2820,13 +2535,7 @@
       </p:grpSpPr>
       <p:sp>
         <p:nvSpPr>
-          <p:cNvPr id="2" name="Title 1">
-            <a:extLst>
-              <a:ext uri="{FF2B5EF4-FFF2-40B4-BE49-F238E27FC236}">
-                <a16:creationId xmlns:a16="http://schemas.microsoft.com/office/drawing/2014/main" id="{E5AB3CEA-DF55-4A96-8C38-9B0091D3FAB0}"/>
-              </a:ext>
-            </a:extLst>
-          </p:cNvPr>
+          <p:cNvPr id="2" name="Title 1"/>
           <p:cNvSpPr>
             <a:spLocks noGrp="1"/>
           </p:cNvSpPr>
@@ -2852,20 +2561,15 @@
               <a:rPr lang="en-US"/>
               <a:t>Click to edit Master title style</a:t>
             </a:r>
-          </a:p>
-        </p:txBody>
-      </p:sp>
-      <p:sp>
-        <p:nvSpPr>
-          <p:cNvPr id="3" name="Picture Placeholder 2">
-            <a:extLst>
-              <a:ext uri="{FF2B5EF4-FFF2-40B4-BE49-F238E27FC236}">
-                <a16:creationId xmlns:a16="http://schemas.microsoft.com/office/drawing/2014/main" id="{E0F873BF-B2BC-4282-A0CC-70DAB99B9E03}"/>
-              </a:ext>
-            </a:extLst>
-          </p:cNvPr>
-          <p:cNvSpPr>
-            <a:spLocks noGrp="1"/>
+            <a:endParaRPr lang="en-US" dirty="0"/>
+          </a:p>
+        </p:txBody>
+      </p:sp>
+      <p:sp>
+        <p:nvSpPr>
+          <p:cNvPr id="3" name="Picture Placeholder 2"/>
+          <p:cNvSpPr>
+            <a:spLocks noGrp="1" noChangeAspect="1"/>
           </p:cNvSpPr>
           <p:nvPr>
             <p:ph type="pic" idx="1"/>
@@ -2878,7 +2582,7 @@
           </a:xfrm>
         </p:spPr>
         <p:txBody>
-          <a:bodyPr/>
+          <a:bodyPr anchor="t"/>
           <a:lstStyle>
             <a:lvl1pPr marL="0" indent="0">
               <a:buNone/>
@@ -2918,19 +2622,17 @@
             </a:lvl9pPr>
           </a:lstStyle>
           <a:p>
-            <a:endParaRPr lang="en-US"/>
-          </a:p>
-        </p:txBody>
-      </p:sp>
-      <p:sp>
-        <p:nvSpPr>
-          <p:cNvPr id="4" name="Text Placeholder 3">
-            <a:extLst>
-              <a:ext uri="{FF2B5EF4-FFF2-40B4-BE49-F238E27FC236}">
-                <a16:creationId xmlns:a16="http://schemas.microsoft.com/office/drawing/2014/main" id="{AC8280B8-8287-4D50-B228-EB6C43D99ED3}"/>
-              </a:ext>
-            </a:extLst>
-          </p:cNvPr>
+            <a:r>
+              <a:rPr lang="en-US"/>
+              <a:t>Click icon to add picture</a:t>
+            </a:r>
+            <a:endParaRPr lang="en-US" dirty="0"/>
+          </a:p>
+        </p:txBody>
+      </p:sp>
+      <p:sp>
+        <p:nvSpPr>
+          <p:cNvPr id="4" name="Text Placeholder 3"/>
           <p:cNvSpPr>
             <a:spLocks noGrp="1"/>
           </p:cNvSpPr>
@@ -2995,13 +2697,7 @@
       </p:sp>
       <p:sp>
         <p:nvSpPr>
-          <p:cNvPr id="5" name="Date Placeholder 4">
-            <a:extLst>
-              <a:ext uri="{FF2B5EF4-FFF2-40B4-BE49-F238E27FC236}">
-                <a16:creationId xmlns:a16="http://schemas.microsoft.com/office/drawing/2014/main" id="{2F386FD3-B76A-4AC8-9D86-1A9741782234}"/>
-              </a:ext>
-            </a:extLst>
-          </p:cNvPr>
+          <p:cNvPr id="5" name="Date Placeholder 4"/>
           <p:cNvSpPr>
             <a:spLocks noGrp="1"/>
           </p:cNvSpPr>
@@ -3016,7 +2712,7 @@
           <a:p>
             <a:fld id="{FC6BE5E1-4448-493C-8281-4A0C48B4313C}" type="datetime1">
               <a:rPr lang="en-US" smtClean="0"/>
-              <a:t>6/15/2018</a:t>
+              <a:t>2018-07-05</a:t>
             </a:fld>
             <a:endParaRPr lang="en-US"/>
           </a:p>
@@ -3024,13 +2720,7 @@
       </p:sp>
       <p:sp>
         <p:nvSpPr>
-          <p:cNvPr id="6" name="Footer Placeholder 5">
-            <a:extLst>
-              <a:ext uri="{FF2B5EF4-FFF2-40B4-BE49-F238E27FC236}">
-                <a16:creationId xmlns:a16="http://schemas.microsoft.com/office/drawing/2014/main" id="{BCEADA13-BA8E-4938-8D78-A86208A24DCC}"/>
-              </a:ext>
-            </a:extLst>
-          </p:cNvPr>
+          <p:cNvPr id="6" name="Footer Placeholder 5"/>
           <p:cNvSpPr>
             <a:spLocks noGrp="1"/>
           </p:cNvSpPr>
@@ -3049,13 +2739,7 @@
       </p:sp>
       <p:sp>
         <p:nvSpPr>
-          <p:cNvPr id="7" name="Slide Number Placeholder 6">
-            <a:extLst>
-              <a:ext uri="{FF2B5EF4-FFF2-40B4-BE49-F238E27FC236}">
-                <a16:creationId xmlns:a16="http://schemas.microsoft.com/office/drawing/2014/main" id="{DF7D99A3-515E-4349-992E-939A43D0E64F}"/>
-              </a:ext>
-            </a:extLst>
-          </p:cNvPr>
+          <p:cNvPr id="7" name="Slide Number Placeholder 6"/>
           <p:cNvSpPr>
             <a:spLocks noGrp="1"/>
           </p:cNvSpPr>
@@ -3079,7 +2763,7 @@
     </p:spTree>
     <p:extLst>
       <p:ext uri="{BB962C8B-B14F-4D97-AF65-F5344CB8AC3E}">
-        <p14:creationId xmlns:p14="http://schemas.microsoft.com/office/powerpoint/2010/main" val="309948125"/>
+        <p14:creationId xmlns:p14="http://schemas.microsoft.com/office/powerpoint/2010/main" val="658399311"/>
       </p:ext>
     </p:extLst>
   </p:cSld>
@@ -3113,13 +2797,7 @@
       </p:grpSpPr>
       <p:sp>
         <p:nvSpPr>
-          <p:cNvPr id="2" name="Title Placeholder 1">
-            <a:extLst>
-              <a:ext uri="{FF2B5EF4-FFF2-40B4-BE49-F238E27FC236}">
-                <a16:creationId xmlns:a16="http://schemas.microsoft.com/office/drawing/2014/main" id="{4D6840D4-DD62-42AB-878C-EB2FFA84DFFC}"/>
-              </a:ext>
-            </a:extLst>
-          </p:cNvPr>
+          <p:cNvPr id="2" name="Title Placeholder 1"/>
           <p:cNvSpPr>
             <a:spLocks noGrp="1"/>
           </p:cNvSpPr>
@@ -3146,18 +2824,13 @@
               <a:rPr lang="en-US"/>
               <a:t>Click to edit Master title style</a:t>
             </a:r>
-          </a:p>
-        </p:txBody>
-      </p:sp>
-      <p:sp>
-        <p:nvSpPr>
-          <p:cNvPr id="3" name="Text Placeholder 2">
-            <a:extLst>
-              <a:ext uri="{FF2B5EF4-FFF2-40B4-BE49-F238E27FC236}">
-                <a16:creationId xmlns:a16="http://schemas.microsoft.com/office/drawing/2014/main" id="{E05F88AC-0BFB-4299-8610-018EDDB29FD1}"/>
-              </a:ext>
-            </a:extLst>
-          </p:cNvPr>
+            <a:endParaRPr lang="en-US" dirty="0"/>
+          </a:p>
+        </p:txBody>
+      </p:sp>
+      <p:sp>
+        <p:nvSpPr>
+          <p:cNvPr id="3" name="Text Placeholder 2"/>
           <p:cNvSpPr>
             <a:spLocks noGrp="1"/>
           </p:cNvSpPr>
@@ -3213,18 +2886,13 @@
               <a:rPr lang="en-US"/>
               <a:t>Fifth level</a:t>
             </a:r>
-          </a:p>
-        </p:txBody>
-      </p:sp>
-      <p:sp>
-        <p:nvSpPr>
-          <p:cNvPr id="4" name="Date Placeholder 3">
-            <a:extLst>
-              <a:ext uri="{FF2B5EF4-FFF2-40B4-BE49-F238E27FC236}">
-                <a16:creationId xmlns:a16="http://schemas.microsoft.com/office/drawing/2014/main" id="{4AEDF52C-4BEC-4DEA-B417-16EE5B44170D}"/>
-              </a:ext>
-            </a:extLst>
-          </p:cNvPr>
+            <a:endParaRPr lang="en-US" dirty="0"/>
+          </a:p>
+        </p:txBody>
+      </p:sp>
+      <p:sp>
+        <p:nvSpPr>
+          <p:cNvPr id="4" name="Date Placeholder 3"/>
           <p:cNvSpPr>
             <a:spLocks noGrp="1"/>
           </p:cNvSpPr>
@@ -3257,7 +2925,7 @@
           <a:p>
             <a:fld id="{B9ACCD46-3949-4FD6-9D13-AB19AE2895AB}" type="datetime1">
               <a:rPr lang="en-US" smtClean="0"/>
-              <a:t>6/15/2018</a:t>
+              <a:t>2018-07-05</a:t>
             </a:fld>
             <a:endParaRPr lang="en-US"/>
           </a:p>
@@ -3265,13 +2933,7 @@
       </p:sp>
       <p:sp>
         <p:nvSpPr>
-          <p:cNvPr id="5" name="Footer Placeholder 4">
-            <a:extLst>
-              <a:ext uri="{FF2B5EF4-FFF2-40B4-BE49-F238E27FC236}">
-                <a16:creationId xmlns:a16="http://schemas.microsoft.com/office/drawing/2014/main" id="{74B1C25C-3AA7-4E15-826D-768CBEFBF54E}"/>
-              </a:ext>
-            </a:extLst>
-          </p:cNvPr>
+          <p:cNvPr id="5" name="Footer Placeholder 4"/>
           <p:cNvSpPr>
             <a:spLocks noGrp="1"/>
           </p:cNvSpPr>
@@ -3308,13 +2970,7 @@
       </p:sp>
       <p:sp>
         <p:nvSpPr>
-          <p:cNvPr id="6" name="Slide Number Placeholder 5">
-            <a:extLst>
-              <a:ext uri="{FF2B5EF4-FFF2-40B4-BE49-F238E27FC236}">
-                <a16:creationId xmlns:a16="http://schemas.microsoft.com/office/drawing/2014/main" id="{C4B4B63E-C849-4E81-B90E-686F6E171913}"/>
-              </a:ext>
-            </a:extLst>
-          </p:cNvPr>
+          <p:cNvPr id="6" name="Slide Number Placeholder 5"/>
           <p:cNvSpPr>
             <a:spLocks noGrp="1"/>
           </p:cNvSpPr>
@@ -3356,23 +3012,23 @@
     </p:spTree>
     <p:extLst>
       <p:ext uri="{BB962C8B-B14F-4D97-AF65-F5344CB8AC3E}">
-        <p14:creationId xmlns:p14="http://schemas.microsoft.com/office/powerpoint/2010/main" val="1606031657"/>
+        <p14:creationId xmlns:p14="http://schemas.microsoft.com/office/powerpoint/2010/main" val="1448900024"/>
       </p:ext>
     </p:extLst>
   </p:cSld>
   <p:clrMap bg1="lt1" tx1="dk1" bg2="lt2" tx2="dk2" accent1="accent1" accent2="accent2" accent3="accent3" accent4="accent4" accent5="accent5" accent6="accent6" hlink="hlink" folHlink="folHlink"/>
   <p:sldLayoutIdLst>
-    <p:sldLayoutId id="2147483649" r:id="rId1"/>
-    <p:sldLayoutId id="2147483650" r:id="rId2"/>
-    <p:sldLayoutId id="2147483651" r:id="rId3"/>
-    <p:sldLayoutId id="2147483652" r:id="rId4"/>
-    <p:sldLayoutId id="2147483653" r:id="rId5"/>
-    <p:sldLayoutId id="2147483654" r:id="rId6"/>
-    <p:sldLayoutId id="2147483655" r:id="rId7"/>
-    <p:sldLayoutId id="2147483656" r:id="rId8"/>
-    <p:sldLayoutId id="2147483657" r:id="rId9"/>
-    <p:sldLayoutId id="2147483658" r:id="rId10"/>
-    <p:sldLayoutId id="2147483659" r:id="rId11"/>
+    <p:sldLayoutId id="2147483709" r:id="rId1"/>
+    <p:sldLayoutId id="2147483710" r:id="rId2"/>
+    <p:sldLayoutId id="2147483711" r:id="rId3"/>
+    <p:sldLayoutId id="2147483712" r:id="rId4"/>
+    <p:sldLayoutId id="2147483713" r:id="rId5"/>
+    <p:sldLayoutId id="2147483714" r:id="rId6"/>
+    <p:sldLayoutId id="2147483715" r:id="rId7"/>
+    <p:sldLayoutId id="2147483716" r:id="rId8"/>
+    <p:sldLayoutId id="2147483717" r:id="rId9"/>
+    <p:sldLayoutId id="2147483718" r:id="rId10"/>
+    <p:sldLayoutId id="2147483719" r:id="rId11"/>
   </p:sldLayoutIdLst>
   <p:hf hdr="0" dt="0"/>
   <p:txStyles>
@@ -3932,6 +3588,14 @@
   <p:clrMapOvr>
     <a:masterClrMapping/>
   </p:clrMapOvr>
+  <mc:AlternateContent xmlns:mc="http://schemas.openxmlformats.org/markup-compatibility/2006">
+    <mc:Choice xmlns:p14="http://schemas.microsoft.com/office/powerpoint/2010/main" Requires="p14">
+      <p:transition p14:dur="10"/>
+    </mc:Choice>
+    <mc:Fallback>
+      <p:transition/>
+    </mc:Fallback>
+  </mc:AlternateContent>
 </p:sld>
 </file>
 
@@ -4008,12 +3672,7 @@
             <p:ph idx="1"/>
           </p:nvPr>
         </p:nvSpPr>
-        <p:spPr>
-          <a:xfrm>
-            <a:off x="838200" y="1825625"/>
-            <a:ext cx="10515600" cy="4351338"/>
-          </a:xfrm>
-        </p:spPr>
+        <p:spPr/>
         <p:txBody>
           <a:bodyPr/>
           <a:lstStyle/>
@@ -4133,12 +3792,7 @@
             <p:ph type="ftr" sz="quarter" idx="11"/>
           </p:nvPr>
         </p:nvSpPr>
-        <p:spPr>
-          <a:xfrm>
-            <a:off x="4038600" y="6356350"/>
-            <a:ext cx="4114800" cy="365125"/>
-          </a:xfrm>
-        </p:spPr>
+        <p:spPr/>
         <p:txBody>
           <a:bodyPr/>
           <a:lstStyle/>
@@ -4163,12 +3817,7 @@
             <p:ph type="sldNum" sz="quarter" idx="12"/>
           </p:nvPr>
         </p:nvSpPr>
-        <p:spPr>
-          <a:xfrm>
-            <a:off x="8610600" y="6356350"/>
-            <a:ext cx="2743200" cy="365125"/>
-          </a:xfrm>
-        </p:spPr>
+        <p:spPr/>
         <p:txBody>
           <a:bodyPr/>
           <a:lstStyle/>
@@ -4194,10 +3843,1951 @@
 </p:sld>
 </file>
 
+<file path=ppt/slides/slide3.xml><?xml version="1.0" encoding="utf-8"?>
+<p:sld xmlns:a="http://schemas.openxmlformats.org/drawingml/2006/main" xmlns:r="http://schemas.openxmlformats.org/officeDocument/2006/relationships" xmlns:p="http://schemas.openxmlformats.org/presentationml/2006/main">
+  <p:cSld>
+    <p:bg>
+      <p:bgPr>
+        <a:solidFill>
+          <a:schemeClr val="bg1"/>
+        </a:solidFill>
+        <a:effectLst/>
+      </p:bgPr>
+    </p:bg>
+    <p:spTree>
+      <p:nvGrpSpPr>
+        <p:cNvPr id="1" name=""/>
+        <p:cNvGrpSpPr/>
+        <p:nvPr/>
+      </p:nvGrpSpPr>
+      <p:grpSpPr>
+        <a:xfrm>
+          <a:off x="0" y="0"/>
+          <a:ext cx="0" cy="0"/>
+          <a:chOff x="0" y="0"/>
+          <a:chExt cx="0" cy="0"/>
+        </a:xfrm>
+      </p:grpSpPr>
+      <p:sp>
+        <p:nvSpPr>
+          <p:cNvPr id="21" name="Rectangle 20">
+            <a:extLst>
+              <a:ext uri="{FF2B5EF4-FFF2-40B4-BE49-F238E27FC236}">
+                <a16:creationId xmlns:a16="http://schemas.microsoft.com/office/drawing/2014/main" id="{867D4867-5BA7-4462-B2F6-A23F4A622AA7}"/>
+              </a:ext>
+              <a:ext uri="{C183D7F6-B498-43B3-948B-1728B52AA6E4}">
+                <adec:decorative xmlns:adec="http://schemas.microsoft.com/office/drawing/2017/decorative" val="1"/>
+              </a:ext>
+            </a:extLst>
+          </p:cNvPr>
+          <p:cNvSpPr>
+            <a:spLocks noGrp="1" noRot="1" noChangeAspect="1" noMove="1" noResize="1" noEditPoints="1" noAdjustHandles="1" noChangeArrowheads="1" noChangeShapeType="1" noTextEdit="1"/>
+          </p:cNvSpPr>
+          <p:nvPr>
+            <p:extLst>
+              <p:ext uri="{386F3935-93C4-4BCD-93E2-E3B085C9AB24}">
+                <p16:designElem xmlns:p16="http://schemas.microsoft.com/office/powerpoint/2015/main" val="1"/>
+              </p:ext>
+            </p:extLst>
+          </p:nvPr>
+        </p:nvSpPr>
+        <p:spPr>
+          <a:xfrm>
+            <a:off x="0" y="0"/>
+            <a:ext cx="4654296" cy="6858000"/>
+          </a:xfrm>
+          <a:prstGeom prst="rect">
+            <a:avLst/>
+          </a:prstGeom>
+          <a:solidFill>
+            <a:schemeClr val="tx1">
+              <a:lumMod val="75000"/>
+              <a:lumOff val="25000"/>
+            </a:schemeClr>
+          </a:solidFill>
+          <a:ln>
+            <a:noFill/>
+          </a:ln>
+        </p:spPr>
+        <p:style>
+          <a:lnRef idx="0">
+            <a:scrgbClr r="0" g="0" b="0"/>
+          </a:lnRef>
+          <a:fillRef idx="0">
+            <a:scrgbClr r="0" g="0" b="0"/>
+          </a:fillRef>
+          <a:effectRef idx="0">
+            <a:scrgbClr r="0" g="0" b="0"/>
+          </a:effectRef>
+          <a:fontRef idx="minor">
+            <a:schemeClr val="lt1"/>
+          </a:fontRef>
+        </p:style>
+        <p:txBody>
+          <a:bodyPr rtlCol="0" anchor="ctr"/>
+          <a:lstStyle/>
+          <a:p>
+            <a:pPr algn="ctr"/>
+            <a:endParaRPr lang="en-US"/>
+          </a:p>
+        </p:txBody>
+      </p:sp>
+      <p:pic>
+        <p:nvPicPr>
+          <p:cNvPr id="6" name="Picture 5" descr="A screenshot of a video game&#10;&#10;Description generated with high confidence">
+            <a:extLst>
+              <a:ext uri="{FF2B5EF4-FFF2-40B4-BE49-F238E27FC236}">
+                <a16:creationId xmlns:a16="http://schemas.microsoft.com/office/drawing/2014/main" id="{50F295EF-89A9-4E39-9089-F7A1B6E777BB}"/>
+              </a:ext>
+            </a:extLst>
+          </p:cNvPr>
+          <p:cNvPicPr>
+            <a:picLocks noChangeAspect="1"/>
+          </p:cNvPicPr>
+          <p:nvPr/>
+        </p:nvPicPr>
+        <p:blipFill>
+          <a:blip r:embed="rId2">
+            <a:extLst>
+              <a:ext uri="{28A0092B-C50C-407E-A947-70E740481C1C}">
+                <a14:useLocalDpi xmlns:a14="http://schemas.microsoft.com/office/drawing/2010/main" val="0"/>
+              </a:ext>
+            </a:extLst>
+          </a:blip>
+          <a:stretch>
+            <a:fillRect/>
+          </a:stretch>
+        </p:blipFill>
+        <p:spPr>
+          <a:xfrm>
+            <a:off x="4666583" y="1847462"/>
+            <a:ext cx="7422780" cy="2639898"/>
+          </a:xfrm>
+          <a:prstGeom prst="rect">
+            <a:avLst/>
+          </a:prstGeom>
+        </p:spPr>
+      </p:pic>
+      <p:sp>
+        <p:nvSpPr>
+          <p:cNvPr id="2" name="Footer Placeholder 1">
+            <a:extLst>
+              <a:ext uri="{FF2B5EF4-FFF2-40B4-BE49-F238E27FC236}">
+                <a16:creationId xmlns:a16="http://schemas.microsoft.com/office/drawing/2014/main" id="{F42EA81F-5E23-4FB2-B4BE-F8D46CBCC469}"/>
+              </a:ext>
+            </a:extLst>
+          </p:cNvPr>
+          <p:cNvSpPr>
+            <a:spLocks noGrp="1"/>
+          </p:cNvSpPr>
+          <p:nvPr>
+            <p:ph type="ftr" sz="quarter" idx="11"/>
+          </p:nvPr>
+        </p:nvSpPr>
+        <p:spPr>
+          <a:xfrm>
+            <a:off x="5297762" y="6356350"/>
+            <a:ext cx="4579768" cy="365125"/>
+          </a:xfrm>
+        </p:spPr>
+        <p:txBody>
+          <a:bodyPr vert="horz" lIns="91440" tIns="45720" rIns="91440" bIns="45720" rtlCol="0" anchor="ctr">
+            <a:normAutofit/>
+          </a:bodyPr>
+          <a:lstStyle/>
+          <a:p>
+            <a:pPr algn="l" defTabSz="914400"/>
+            <a:endParaRPr lang="en-US" sz="1200" kern="1200">
+              <a:solidFill>
+                <a:schemeClr val="tx1">
+                  <a:alpha val="80000"/>
+                </a:schemeClr>
+              </a:solidFill>
+              <a:latin typeface="+mn-lt"/>
+              <a:ea typeface="+mn-ea"/>
+              <a:cs typeface="+mn-cs"/>
+            </a:endParaRPr>
+          </a:p>
+        </p:txBody>
+      </p:sp>
+      <p:sp>
+        <p:nvSpPr>
+          <p:cNvPr id="3" name="Slide Number Placeholder 2">
+            <a:extLst>
+              <a:ext uri="{FF2B5EF4-FFF2-40B4-BE49-F238E27FC236}">
+                <a16:creationId xmlns:a16="http://schemas.microsoft.com/office/drawing/2014/main" id="{61EECAE5-6569-491B-971A-BC88782B578D}"/>
+              </a:ext>
+            </a:extLst>
+          </p:cNvPr>
+          <p:cNvSpPr>
+            <a:spLocks noGrp="1"/>
+          </p:cNvSpPr>
+          <p:nvPr>
+            <p:ph type="sldNum" sz="quarter" idx="12"/>
+          </p:nvPr>
+        </p:nvSpPr>
+        <p:spPr>
+          <a:xfrm>
+            <a:off x="10289512" y="6356350"/>
+            <a:ext cx="1064287" cy="365125"/>
+          </a:xfrm>
+        </p:spPr>
+        <p:txBody>
+          <a:bodyPr vert="horz" lIns="91440" tIns="45720" rIns="91440" bIns="45720" rtlCol="0" anchor="ctr">
+            <a:normAutofit/>
+          </a:bodyPr>
+          <a:lstStyle/>
+          <a:p>
+            <a:pPr defTabSz="914400">
+              <a:spcAft>
+                <a:spcPts val="600"/>
+              </a:spcAft>
+            </a:pPr>
+            <a:fld id="{8FCAAC12-ECE3-429D-A5B3-AAB453D53177}" type="slidenum">
+              <a:rPr lang="en-US" smtClean="0">
+                <a:solidFill>
+                  <a:schemeClr val="tx1">
+                    <a:alpha val="80000"/>
+                  </a:schemeClr>
+                </a:solidFill>
+              </a:rPr>
+              <a:pPr defTabSz="914400">
+                <a:spcAft>
+                  <a:spcPts val="600"/>
+                </a:spcAft>
+              </a:pPr>
+              <a:t>3</a:t>
+            </a:fld>
+            <a:endParaRPr lang="en-US">
+              <a:solidFill>
+                <a:schemeClr val="tx1">
+                  <a:alpha val="80000"/>
+                </a:schemeClr>
+              </a:solidFill>
+            </a:endParaRPr>
+          </a:p>
+        </p:txBody>
+      </p:sp>
+      <p:sp>
+        <p:nvSpPr>
+          <p:cNvPr id="4" name="TextBox 3">
+            <a:extLst>
+              <a:ext uri="{FF2B5EF4-FFF2-40B4-BE49-F238E27FC236}">
+                <a16:creationId xmlns:a16="http://schemas.microsoft.com/office/drawing/2014/main" id="{7DC101CF-C5D3-4A4C-B8BD-8548988EFDBD}"/>
+              </a:ext>
+            </a:extLst>
+          </p:cNvPr>
+          <p:cNvSpPr txBox="1"/>
+          <p:nvPr/>
+        </p:nvSpPr>
+        <p:spPr>
+          <a:xfrm>
+            <a:off x="114100" y="139959"/>
+            <a:ext cx="4422710" cy="1596970"/>
+          </a:xfrm>
+          <a:prstGeom prst="rect">
+            <a:avLst/>
+          </a:prstGeom>
+          <a:noFill/>
+          <a:ln w="19050">
+            <a:solidFill>
+              <a:schemeClr val="bg1"/>
+            </a:solidFill>
+          </a:ln>
+        </p:spPr>
+        <p:txBody>
+          <a:bodyPr vert="horz" wrap="square" lIns="91440" tIns="45720" rIns="91440" bIns="45720" rtlCol="0" anchor="ctr">
+            <a:normAutofit/>
+          </a:bodyPr>
+          <a:lstStyle/>
+          <a:p>
+            <a:pPr algn="ctr" defTabSz="914400">
+              <a:lnSpc>
+                <a:spcPct val="90000"/>
+              </a:lnSpc>
+              <a:spcBef>
+                <a:spcPct val="0"/>
+              </a:spcBef>
+              <a:spcAft>
+                <a:spcPts val="600"/>
+              </a:spcAft>
+            </a:pPr>
+            <a:r>
+              <a:rPr lang="en-US" sz="2800" b="1" kern="1200" dirty="0" err="1">
+                <a:solidFill>
+                  <a:schemeClr val="bg1"/>
+                </a:solidFill>
+                <a:latin typeface="Book Antiqua" panose="02040602050305030304" pitchFamily="18" charset="0"/>
+                <a:ea typeface="+mj-ea"/>
+                <a:cs typeface="+mj-cs"/>
+              </a:rPr>
+              <a:t>Δυ</a:t>
+            </a:r>
+            <a:r>
+              <a:rPr lang="en-US" sz="2800" b="1" kern="1200" dirty="0">
+                <a:solidFill>
+                  <a:schemeClr val="bg1"/>
+                </a:solidFill>
+                <a:latin typeface="Book Antiqua" panose="02040602050305030304" pitchFamily="18" charset="0"/>
+                <a:ea typeface="+mj-ea"/>
+                <a:cs typeface="+mj-cs"/>
+              </a:rPr>
+              <a:t>αδικός αθροιστής Διάδοσης κρατουμένου</a:t>
+            </a:r>
+          </a:p>
+        </p:txBody>
+      </p:sp>
+      <p:sp>
+        <p:nvSpPr>
+          <p:cNvPr id="7" name="TextBox 6">
+            <a:extLst>
+              <a:ext uri="{FF2B5EF4-FFF2-40B4-BE49-F238E27FC236}">
+                <a16:creationId xmlns:a16="http://schemas.microsoft.com/office/drawing/2014/main" id="{11DA6202-482A-4DF1-8965-56587702257D}"/>
+              </a:ext>
+            </a:extLst>
+          </p:cNvPr>
+          <p:cNvSpPr txBox="1"/>
+          <p:nvPr/>
+        </p:nvSpPr>
+        <p:spPr>
+          <a:xfrm>
+            <a:off x="643468" y="3429000"/>
+            <a:ext cx="3363974" cy="2624666"/>
+          </a:xfrm>
+          <a:prstGeom prst="rect">
+            <a:avLst/>
+          </a:prstGeom>
+        </p:spPr>
+        <p:txBody>
+          <a:bodyPr vert="horz" lIns="91440" tIns="45720" rIns="91440" bIns="45720" rtlCol="0">
+            <a:normAutofit/>
+          </a:bodyPr>
+          <a:lstStyle/>
+          <a:p>
+            <a:pPr marL="285750" indent="-228600" defTabSz="914400">
+              <a:lnSpc>
+                <a:spcPct val="90000"/>
+              </a:lnSpc>
+              <a:spcAft>
+                <a:spcPts val="600"/>
+              </a:spcAft>
+              <a:buFont typeface="Arial" panose="020B0604020202020204" pitchFamily="34" charset="0"/>
+              <a:buChar char="•"/>
+            </a:pPr>
+            <a:r>
+              <a:rPr lang="en-US" sz="2000" dirty="0">
+                <a:solidFill>
+                  <a:schemeClr val="bg1"/>
+                </a:solidFill>
+                <a:latin typeface="Book Antiqua" panose="02040602050305030304" pitchFamily="18" charset="0"/>
+              </a:rPr>
+              <a:t>Απ</a:t>
+            </a:r>
+            <a:r>
+              <a:rPr lang="en-US" sz="2000" dirty="0" err="1">
+                <a:solidFill>
+                  <a:schemeClr val="bg1"/>
+                </a:solidFill>
+                <a:latin typeface="Book Antiqua" panose="02040602050305030304" pitchFamily="18" charset="0"/>
+              </a:rPr>
+              <a:t>λός</a:t>
+            </a:r>
+            <a:r>
+              <a:rPr lang="en-US" sz="2000" dirty="0">
+                <a:solidFill>
+                  <a:schemeClr val="bg1"/>
+                </a:solidFill>
+                <a:latin typeface="Book Antiqua" panose="02040602050305030304" pitchFamily="18" charset="0"/>
+              </a:rPr>
+              <a:t> </a:t>
+            </a:r>
+            <a:r>
+              <a:rPr lang="en-US" sz="2000" dirty="0" err="1">
+                <a:solidFill>
+                  <a:schemeClr val="bg1"/>
+                </a:solidFill>
+                <a:latin typeface="Book Antiqua" panose="02040602050305030304" pitchFamily="18" charset="0"/>
+              </a:rPr>
+              <a:t>Σχεδι</a:t>
+            </a:r>
+            <a:r>
+              <a:rPr lang="en-US" sz="2000" dirty="0">
+                <a:solidFill>
+                  <a:schemeClr val="bg1"/>
+                </a:solidFill>
+                <a:latin typeface="Book Antiqua" panose="02040602050305030304" pitchFamily="18" charset="0"/>
+              </a:rPr>
+              <a:t>ασμός</a:t>
+            </a:r>
+            <a:endParaRPr lang="el-GR" sz="2000" dirty="0">
+              <a:solidFill>
+                <a:schemeClr val="bg1"/>
+              </a:solidFill>
+              <a:latin typeface="Book Antiqua" panose="02040602050305030304" pitchFamily="18" charset="0"/>
+            </a:endParaRPr>
+          </a:p>
+          <a:p>
+            <a:pPr marL="57150" defTabSz="914400">
+              <a:lnSpc>
+                <a:spcPct val="90000"/>
+              </a:lnSpc>
+              <a:spcAft>
+                <a:spcPts val="600"/>
+              </a:spcAft>
+            </a:pPr>
+            <a:endParaRPr lang="en-US" sz="2000" dirty="0">
+              <a:solidFill>
+                <a:schemeClr val="bg1"/>
+              </a:solidFill>
+              <a:latin typeface="Book Antiqua" panose="02040602050305030304" pitchFamily="18" charset="0"/>
+            </a:endParaRPr>
+          </a:p>
+          <a:p>
+            <a:pPr marL="285750" indent="-228600" defTabSz="914400">
+              <a:lnSpc>
+                <a:spcPct val="90000"/>
+              </a:lnSpc>
+              <a:spcAft>
+                <a:spcPts val="600"/>
+              </a:spcAft>
+              <a:buFont typeface="Arial" panose="020B0604020202020204" pitchFamily="34" charset="0"/>
+              <a:buChar char="•"/>
+            </a:pPr>
+            <a:r>
+              <a:rPr lang="en-US" sz="2000" dirty="0" err="1">
+                <a:solidFill>
+                  <a:schemeClr val="bg1"/>
+                </a:solidFill>
+                <a:latin typeface="Book Antiqua" panose="02040602050305030304" pitchFamily="18" charset="0"/>
+              </a:rPr>
+              <a:t>Μεγάλες</a:t>
+            </a:r>
+            <a:r>
+              <a:rPr lang="en-US" sz="2000" dirty="0">
+                <a:solidFill>
+                  <a:schemeClr val="bg1"/>
+                </a:solidFill>
+                <a:latin typeface="Book Antiqua" panose="02040602050305030304" pitchFamily="18" charset="0"/>
+              </a:rPr>
+              <a:t> Κα</a:t>
+            </a:r>
+            <a:r>
+              <a:rPr lang="en-US" sz="2000" dirty="0" err="1">
+                <a:solidFill>
+                  <a:schemeClr val="bg1"/>
+                </a:solidFill>
+                <a:latin typeface="Book Antiqua" panose="02040602050305030304" pitchFamily="18" charset="0"/>
+              </a:rPr>
+              <a:t>θυστερήσεις</a:t>
+            </a:r>
+            <a:endParaRPr lang="en-US" sz="2000" dirty="0">
+              <a:solidFill>
+                <a:schemeClr val="bg1"/>
+              </a:solidFill>
+              <a:latin typeface="Book Antiqua" panose="02040602050305030304" pitchFamily="18" charset="0"/>
+            </a:endParaRPr>
+          </a:p>
+        </p:txBody>
+      </p:sp>
+    </p:spTree>
+    <p:extLst>
+      <p:ext uri="{BB962C8B-B14F-4D97-AF65-F5344CB8AC3E}">
+        <p14:creationId xmlns:p14="http://schemas.microsoft.com/office/powerpoint/2010/main" val="3246475532"/>
+      </p:ext>
+    </p:extLst>
+  </p:cSld>
+  <p:clrMapOvr>
+    <a:masterClrMapping/>
+  </p:clrMapOvr>
+</p:sld>
+</file>
+
+<file path=ppt/slides/slide4.xml><?xml version="1.0" encoding="utf-8"?>
+<p:sld xmlns:a="http://schemas.openxmlformats.org/drawingml/2006/main" xmlns:r="http://schemas.openxmlformats.org/officeDocument/2006/relationships" xmlns:p="http://schemas.openxmlformats.org/presentationml/2006/main">
+  <p:cSld>
+    <p:bg>
+      <p:bgPr>
+        <a:solidFill>
+          <a:schemeClr val="bg1"/>
+        </a:solidFill>
+        <a:effectLst/>
+      </p:bgPr>
+    </p:bg>
+    <p:spTree>
+      <p:nvGrpSpPr>
+        <p:cNvPr id="1" name=""/>
+        <p:cNvGrpSpPr/>
+        <p:nvPr/>
+      </p:nvGrpSpPr>
+      <p:grpSpPr>
+        <a:xfrm>
+          <a:off x="0" y="0"/>
+          <a:ext cx="0" cy="0"/>
+          <a:chOff x="0" y="0"/>
+          <a:chExt cx="0" cy="0"/>
+        </a:xfrm>
+      </p:grpSpPr>
+      <p:sp>
+        <p:nvSpPr>
+          <p:cNvPr id="12" name="Rectangle 11">
+            <a:extLst>
+              <a:ext uri="{FF2B5EF4-FFF2-40B4-BE49-F238E27FC236}">
+                <a16:creationId xmlns:a16="http://schemas.microsoft.com/office/drawing/2014/main" id="{867D4867-5BA7-4462-B2F6-A23F4A622AA7}"/>
+              </a:ext>
+              <a:ext uri="{C183D7F6-B498-43B3-948B-1728B52AA6E4}">
+                <adec:decorative xmlns:adec="http://schemas.microsoft.com/office/drawing/2017/decorative" val="1"/>
+              </a:ext>
+            </a:extLst>
+          </p:cNvPr>
+          <p:cNvSpPr>
+            <a:spLocks noGrp="1" noRot="1" noChangeAspect="1" noMove="1" noResize="1" noEditPoints="1" noAdjustHandles="1" noChangeArrowheads="1" noChangeShapeType="1" noTextEdit="1"/>
+          </p:cNvSpPr>
+          <p:nvPr>
+            <p:extLst>
+              <p:ext uri="{386F3935-93C4-4BCD-93E2-E3B085C9AB24}">
+                <p16:designElem xmlns:p16="http://schemas.microsoft.com/office/powerpoint/2015/main" val="1"/>
+              </p:ext>
+            </p:extLst>
+          </p:nvPr>
+        </p:nvSpPr>
+        <p:spPr>
+          <a:xfrm>
+            <a:off x="0" y="0"/>
+            <a:ext cx="4654296" cy="6858000"/>
+          </a:xfrm>
+          <a:prstGeom prst="rect">
+            <a:avLst/>
+          </a:prstGeom>
+          <a:solidFill>
+            <a:schemeClr val="tx1">
+              <a:lumMod val="75000"/>
+              <a:lumOff val="25000"/>
+            </a:schemeClr>
+          </a:solidFill>
+          <a:ln>
+            <a:noFill/>
+          </a:ln>
+        </p:spPr>
+        <p:style>
+          <a:lnRef idx="0">
+            <a:scrgbClr r="0" g="0" b="0"/>
+          </a:lnRef>
+          <a:fillRef idx="0">
+            <a:scrgbClr r="0" g="0" b="0"/>
+          </a:fillRef>
+          <a:effectRef idx="0">
+            <a:scrgbClr r="0" g="0" b="0"/>
+          </a:effectRef>
+          <a:fontRef idx="minor">
+            <a:schemeClr val="lt1"/>
+          </a:fontRef>
+        </p:style>
+        <p:txBody>
+          <a:bodyPr rtlCol="0" anchor="ctr"/>
+          <a:lstStyle/>
+          <a:p>
+            <a:pPr algn="ctr"/>
+            <a:endParaRPr lang="en-US"/>
+          </a:p>
+        </p:txBody>
+      </p:sp>
+      <p:pic>
+        <p:nvPicPr>
+          <p:cNvPr id="6" name="Picture 5" descr="A screenshot of a cell phone&#10;&#10;Description generated with very high confidence">
+            <a:extLst>
+              <a:ext uri="{FF2B5EF4-FFF2-40B4-BE49-F238E27FC236}">
+                <a16:creationId xmlns:a16="http://schemas.microsoft.com/office/drawing/2014/main" id="{4F25422E-423D-4ABB-AC3A-E585E39C31A1}"/>
+              </a:ext>
+            </a:extLst>
+          </p:cNvPr>
+          <p:cNvPicPr>
+            <a:picLocks noChangeAspect="1"/>
+          </p:cNvPicPr>
+          <p:nvPr/>
+        </p:nvPicPr>
+        <p:blipFill>
+          <a:blip r:embed="rId2">
+            <a:extLst>
+              <a:ext uri="{28A0092B-C50C-407E-A947-70E740481C1C}">
+                <a14:useLocalDpi xmlns:a14="http://schemas.microsoft.com/office/drawing/2010/main" val="0"/>
+              </a:ext>
+            </a:extLst>
+          </a:blip>
+          <a:stretch>
+            <a:fillRect/>
+          </a:stretch>
+        </p:blipFill>
+        <p:spPr>
+          <a:xfrm>
+            <a:off x="5425807" y="643467"/>
+            <a:ext cx="5994680" cy="5410199"/>
+          </a:xfrm>
+          <a:prstGeom prst="rect">
+            <a:avLst/>
+          </a:prstGeom>
+        </p:spPr>
+      </p:pic>
+      <p:sp>
+        <p:nvSpPr>
+          <p:cNvPr id="2" name="Footer Placeholder 1">
+            <a:extLst>
+              <a:ext uri="{FF2B5EF4-FFF2-40B4-BE49-F238E27FC236}">
+                <a16:creationId xmlns:a16="http://schemas.microsoft.com/office/drawing/2014/main" id="{560EEB24-CBF5-4906-91CF-634FD21C65A8}"/>
+              </a:ext>
+            </a:extLst>
+          </p:cNvPr>
+          <p:cNvSpPr>
+            <a:spLocks noGrp="1"/>
+          </p:cNvSpPr>
+          <p:nvPr>
+            <p:ph type="ftr" sz="quarter" idx="11"/>
+          </p:nvPr>
+        </p:nvSpPr>
+        <p:spPr>
+          <a:xfrm>
+            <a:off x="5297762" y="6356350"/>
+            <a:ext cx="4579768" cy="365125"/>
+          </a:xfrm>
+        </p:spPr>
+        <p:txBody>
+          <a:bodyPr vert="horz" lIns="91440" tIns="45720" rIns="91440" bIns="45720" rtlCol="0" anchor="ctr">
+            <a:normAutofit/>
+          </a:bodyPr>
+          <a:lstStyle/>
+          <a:p>
+            <a:pPr algn="l" defTabSz="914400"/>
+            <a:endParaRPr lang="en-US" sz="1200" kern="1200">
+              <a:solidFill>
+                <a:schemeClr val="tx1">
+                  <a:alpha val="80000"/>
+                </a:schemeClr>
+              </a:solidFill>
+              <a:latin typeface="+mn-lt"/>
+              <a:ea typeface="+mn-ea"/>
+              <a:cs typeface="+mn-cs"/>
+            </a:endParaRPr>
+          </a:p>
+        </p:txBody>
+      </p:sp>
+      <p:sp>
+        <p:nvSpPr>
+          <p:cNvPr id="3" name="Slide Number Placeholder 2">
+            <a:extLst>
+              <a:ext uri="{FF2B5EF4-FFF2-40B4-BE49-F238E27FC236}">
+                <a16:creationId xmlns:a16="http://schemas.microsoft.com/office/drawing/2014/main" id="{8A83956F-2F03-44D5-91C8-D0538357791E}"/>
+              </a:ext>
+            </a:extLst>
+          </p:cNvPr>
+          <p:cNvSpPr>
+            <a:spLocks noGrp="1"/>
+          </p:cNvSpPr>
+          <p:nvPr>
+            <p:ph type="sldNum" sz="quarter" idx="12"/>
+          </p:nvPr>
+        </p:nvSpPr>
+        <p:spPr>
+          <a:xfrm>
+            <a:off x="10289512" y="6356350"/>
+            <a:ext cx="1064287" cy="365125"/>
+          </a:xfrm>
+        </p:spPr>
+        <p:txBody>
+          <a:bodyPr vert="horz" lIns="91440" tIns="45720" rIns="91440" bIns="45720" rtlCol="0" anchor="ctr">
+            <a:normAutofit/>
+          </a:bodyPr>
+          <a:lstStyle/>
+          <a:p>
+            <a:pPr defTabSz="914400">
+              <a:spcAft>
+                <a:spcPts val="600"/>
+              </a:spcAft>
+            </a:pPr>
+            <a:fld id="{8FCAAC12-ECE3-429D-A5B3-AAB453D53177}" type="slidenum">
+              <a:rPr lang="en-US">
+                <a:solidFill>
+                  <a:schemeClr val="tx1">
+                    <a:alpha val="80000"/>
+                  </a:schemeClr>
+                </a:solidFill>
+              </a:rPr>
+              <a:pPr defTabSz="914400">
+                <a:spcAft>
+                  <a:spcPts val="600"/>
+                </a:spcAft>
+              </a:pPr>
+              <a:t>4</a:t>
+            </a:fld>
+            <a:endParaRPr lang="en-US">
+              <a:solidFill>
+                <a:schemeClr val="tx1">
+                  <a:alpha val="80000"/>
+                </a:schemeClr>
+              </a:solidFill>
+            </a:endParaRPr>
+          </a:p>
+        </p:txBody>
+      </p:sp>
+      <p:sp>
+        <p:nvSpPr>
+          <p:cNvPr id="4" name="TextBox 3">
+            <a:extLst>
+              <a:ext uri="{FF2B5EF4-FFF2-40B4-BE49-F238E27FC236}">
+                <a16:creationId xmlns:a16="http://schemas.microsoft.com/office/drawing/2014/main" id="{69B13433-A540-4E67-A91C-3B68273E00A1}"/>
+              </a:ext>
+            </a:extLst>
+          </p:cNvPr>
+          <p:cNvSpPr txBox="1"/>
+          <p:nvPr/>
+        </p:nvSpPr>
+        <p:spPr>
+          <a:xfrm>
+            <a:off x="93306" y="93306"/>
+            <a:ext cx="4469363" cy="1819470"/>
+          </a:xfrm>
+          <a:prstGeom prst="rect">
+            <a:avLst/>
+          </a:prstGeom>
+          <a:noFill/>
+          <a:ln w="19050">
+            <a:solidFill>
+              <a:schemeClr val="bg1"/>
+            </a:solidFill>
+          </a:ln>
+        </p:spPr>
+        <p:txBody>
+          <a:bodyPr vert="horz" wrap="square" lIns="91440" tIns="45720" rIns="91440" bIns="45720" rtlCol="0" anchor="ctr">
+            <a:normAutofit/>
+          </a:bodyPr>
+          <a:lstStyle/>
+          <a:p>
+            <a:pPr algn="ctr" defTabSz="914400">
+              <a:lnSpc>
+                <a:spcPct val="90000"/>
+              </a:lnSpc>
+              <a:spcBef>
+                <a:spcPct val="0"/>
+              </a:spcBef>
+              <a:spcAft>
+                <a:spcPts val="600"/>
+              </a:spcAft>
+            </a:pPr>
+            <a:r>
+              <a:rPr lang="en-US" sz="2600" b="1" kern="1200" dirty="0" err="1">
+                <a:solidFill>
+                  <a:schemeClr val="bg1"/>
+                </a:solidFill>
+                <a:latin typeface="Book Antiqua" panose="02040602050305030304" pitchFamily="18" charset="0"/>
+                <a:ea typeface="+mj-ea"/>
+                <a:cs typeface="+mj-cs"/>
+              </a:rPr>
+              <a:t>Αθροιστής</a:t>
+            </a:r>
+            <a:r>
+              <a:rPr lang="en-US" sz="2600" b="1" kern="1200" dirty="0">
+                <a:solidFill>
+                  <a:schemeClr val="bg1"/>
+                </a:solidFill>
+                <a:latin typeface="Book Antiqua" panose="02040602050305030304" pitchFamily="18" charset="0"/>
+                <a:ea typeface="+mj-ea"/>
+                <a:cs typeface="+mj-cs"/>
+              </a:rPr>
+              <a:t> </a:t>
+            </a:r>
+            <a:r>
+              <a:rPr lang="en-US" sz="2600" b="1" kern="1200" dirty="0" err="1">
+                <a:solidFill>
+                  <a:schemeClr val="bg1"/>
+                </a:solidFill>
+                <a:latin typeface="Book Antiqua" panose="02040602050305030304" pitchFamily="18" charset="0"/>
+                <a:ea typeface="+mj-ea"/>
+                <a:cs typeface="+mj-cs"/>
+              </a:rPr>
+              <a:t>Πρό</a:t>
+            </a:r>
+            <a:r>
+              <a:rPr lang="en-US" sz="2600" b="1" kern="1200" dirty="0">
+                <a:solidFill>
+                  <a:schemeClr val="bg1"/>
+                </a:solidFill>
+                <a:latin typeface="Book Antiqua" panose="02040602050305030304" pitchFamily="18" charset="0"/>
+                <a:ea typeface="+mj-ea"/>
+                <a:cs typeface="+mj-cs"/>
+              </a:rPr>
+              <a:t>βλεψης Κρατουμένου </a:t>
+            </a:r>
+            <a:endParaRPr lang="el-GR" sz="2600" b="1" kern="1200" dirty="0">
+              <a:solidFill>
+                <a:schemeClr val="bg1"/>
+              </a:solidFill>
+              <a:latin typeface="Book Antiqua" panose="02040602050305030304" pitchFamily="18" charset="0"/>
+              <a:ea typeface="+mj-ea"/>
+              <a:cs typeface="+mj-cs"/>
+            </a:endParaRPr>
+          </a:p>
+          <a:p>
+            <a:pPr algn="ctr" defTabSz="914400">
+              <a:lnSpc>
+                <a:spcPct val="90000"/>
+              </a:lnSpc>
+              <a:spcBef>
+                <a:spcPct val="0"/>
+              </a:spcBef>
+              <a:spcAft>
+                <a:spcPts val="600"/>
+              </a:spcAft>
+            </a:pPr>
+            <a:r>
+              <a:rPr lang="el-GR" sz="2600" b="1" kern="1200" dirty="0">
+                <a:solidFill>
+                  <a:schemeClr val="bg1"/>
+                </a:solidFill>
+                <a:latin typeface="Book Antiqua" panose="02040602050305030304" pitchFamily="18" charset="0"/>
+                <a:ea typeface="+mj-ea"/>
+                <a:cs typeface="+mj-cs"/>
+              </a:rPr>
+              <a:t> (</a:t>
+            </a:r>
+            <a:r>
+              <a:rPr lang="en-US" sz="2600" b="1" kern="1200" dirty="0">
+                <a:solidFill>
+                  <a:schemeClr val="bg1"/>
+                </a:solidFill>
+                <a:latin typeface="Book Antiqua" panose="02040602050305030304" pitchFamily="18" charset="0"/>
+                <a:ea typeface="+mj-ea"/>
+                <a:cs typeface="+mj-cs"/>
+              </a:rPr>
+              <a:t>Carry Look Ahead</a:t>
+            </a:r>
+            <a:r>
+              <a:rPr lang="el-GR" sz="2600" b="1" kern="1200" dirty="0">
+                <a:solidFill>
+                  <a:schemeClr val="bg1"/>
+                </a:solidFill>
+                <a:latin typeface="Book Antiqua" panose="02040602050305030304" pitchFamily="18" charset="0"/>
+                <a:ea typeface="+mj-ea"/>
+                <a:cs typeface="+mj-cs"/>
+              </a:rPr>
+              <a:t>)</a:t>
+            </a:r>
+            <a:endParaRPr lang="en-US" sz="2600" b="1" kern="1200" dirty="0">
+              <a:solidFill>
+                <a:schemeClr val="bg1"/>
+              </a:solidFill>
+              <a:latin typeface="Book Antiqua" panose="02040602050305030304" pitchFamily="18" charset="0"/>
+              <a:ea typeface="+mj-ea"/>
+              <a:cs typeface="+mj-cs"/>
+            </a:endParaRPr>
+          </a:p>
+        </p:txBody>
+      </p:sp>
+      <p:sp>
+        <p:nvSpPr>
+          <p:cNvPr id="7" name="TextBox 6">
+            <a:extLst>
+              <a:ext uri="{FF2B5EF4-FFF2-40B4-BE49-F238E27FC236}">
+                <a16:creationId xmlns:a16="http://schemas.microsoft.com/office/drawing/2014/main" id="{8A3349CA-F54C-451F-BB94-D40D805C2BBE}"/>
+              </a:ext>
+            </a:extLst>
+          </p:cNvPr>
+          <p:cNvSpPr txBox="1"/>
+          <p:nvPr/>
+        </p:nvSpPr>
+        <p:spPr>
+          <a:xfrm>
+            <a:off x="643468" y="2638044"/>
+            <a:ext cx="3363974" cy="3109613"/>
+          </a:xfrm>
+          <a:prstGeom prst="rect">
+            <a:avLst/>
+          </a:prstGeom>
+        </p:spPr>
+        <p:txBody>
+          <a:bodyPr vert="horz" lIns="91440" tIns="45720" rIns="91440" bIns="45720" rtlCol="0">
+            <a:normAutofit/>
+          </a:bodyPr>
+          <a:lstStyle/>
+          <a:p>
+            <a:pPr defTabSz="914400">
+              <a:lnSpc>
+                <a:spcPct val="90000"/>
+              </a:lnSpc>
+              <a:spcAft>
+                <a:spcPts val="600"/>
+              </a:spcAft>
+            </a:pPr>
+            <a:r>
+              <a:rPr lang="en-US" sz="2000" b="1" u="sng" dirty="0" err="1">
+                <a:solidFill>
+                  <a:schemeClr val="bg1"/>
+                </a:solidFill>
+                <a:latin typeface="Book Antiqua" panose="02040602050305030304" pitchFamily="18" charset="0"/>
+              </a:rPr>
+              <a:t>Μειονέκτημ</a:t>
+            </a:r>
+            <a:r>
+              <a:rPr lang="en-US" sz="2000" b="1" u="sng" dirty="0">
+                <a:solidFill>
+                  <a:schemeClr val="bg1"/>
+                </a:solidFill>
+                <a:latin typeface="Book Antiqua" panose="02040602050305030304" pitchFamily="18" charset="0"/>
+              </a:rPr>
+              <a:t>α</a:t>
+            </a:r>
+          </a:p>
+          <a:p>
+            <a:pPr marL="342900" indent="-228600" defTabSz="914400">
+              <a:lnSpc>
+                <a:spcPct val="90000"/>
+              </a:lnSpc>
+              <a:spcAft>
+                <a:spcPts val="600"/>
+              </a:spcAft>
+              <a:buFont typeface="Arial" panose="020B0604020202020204" pitchFamily="34" charset="0"/>
+              <a:buChar char="•"/>
+            </a:pPr>
+            <a:r>
+              <a:rPr lang="en-US" sz="2000" dirty="0">
+                <a:solidFill>
+                  <a:schemeClr val="bg1"/>
+                </a:solidFill>
+                <a:latin typeface="Book Antiqua" panose="02040602050305030304" pitchFamily="18" charset="0"/>
+              </a:rPr>
+              <a:t>Επιπ</a:t>
+            </a:r>
+            <a:r>
+              <a:rPr lang="en-US" sz="2000" dirty="0" err="1">
+                <a:solidFill>
+                  <a:schemeClr val="bg1"/>
+                </a:solidFill>
+                <a:latin typeface="Book Antiqua" panose="02040602050305030304" pitchFamily="18" charset="0"/>
+              </a:rPr>
+              <a:t>λέον</a:t>
+            </a:r>
+            <a:r>
+              <a:rPr lang="en-US" sz="2000" dirty="0">
+                <a:solidFill>
+                  <a:schemeClr val="bg1"/>
+                </a:solidFill>
+                <a:latin typeface="Book Antiqua" panose="02040602050305030304" pitchFamily="18" charset="0"/>
+              </a:rPr>
+              <a:t> </a:t>
+            </a:r>
+            <a:r>
+              <a:rPr lang="en-US" sz="2000" dirty="0" err="1">
+                <a:solidFill>
+                  <a:schemeClr val="bg1"/>
+                </a:solidFill>
+                <a:latin typeface="Book Antiqua" panose="02040602050305030304" pitchFamily="18" charset="0"/>
+              </a:rPr>
+              <a:t>υλικό</a:t>
+            </a:r>
+            <a:r>
+              <a:rPr lang="en-US" sz="2000" dirty="0">
+                <a:solidFill>
+                  <a:schemeClr val="bg1"/>
+                </a:solidFill>
+                <a:latin typeface="Book Antiqua" panose="02040602050305030304" pitchFamily="18" charset="0"/>
+              </a:rPr>
+              <a:t> </a:t>
+            </a:r>
+            <a:r>
+              <a:rPr lang="en-US" sz="2000" dirty="0">
+                <a:solidFill>
+                  <a:schemeClr val="bg1"/>
+                </a:solidFill>
+                <a:latin typeface="Book Antiqua" panose="02040602050305030304" pitchFamily="18" charset="0"/>
+                <a:sym typeface="Wingdings" panose="05000000000000000000" pitchFamily="2" charset="2"/>
+              </a:rPr>
+              <a:t> </a:t>
+            </a:r>
+            <a:r>
+              <a:rPr lang="en-US" sz="2000" dirty="0" err="1">
+                <a:solidFill>
+                  <a:schemeClr val="bg1"/>
+                </a:solidFill>
+                <a:latin typeface="Book Antiqua" panose="02040602050305030304" pitchFamily="18" charset="0"/>
+                <a:sym typeface="Wingdings" panose="05000000000000000000" pitchFamily="2" charset="2"/>
+              </a:rPr>
+              <a:t>Εμ</a:t>
+            </a:r>
+            <a:r>
+              <a:rPr lang="en-US" sz="2000" dirty="0">
+                <a:solidFill>
+                  <a:schemeClr val="bg1"/>
+                </a:solidFill>
+                <a:latin typeface="Book Antiqua" panose="02040602050305030304" pitchFamily="18" charset="0"/>
+                <a:sym typeface="Wingdings" panose="05000000000000000000" pitchFamily="2" charset="2"/>
+              </a:rPr>
+              <a:t>βαδόν και κατανάλωση ενέργειας</a:t>
+            </a:r>
+          </a:p>
+          <a:p>
+            <a:pPr marL="342900" indent="-228600" defTabSz="914400">
+              <a:lnSpc>
+                <a:spcPct val="90000"/>
+              </a:lnSpc>
+              <a:spcAft>
+                <a:spcPts val="600"/>
+              </a:spcAft>
+              <a:buFont typeface="Arial" panose="020B0604020202020204" pitchFamily="34" charset="0"/>
+              <a:buChar char="•"/>
+            </a:pPr>
+            <a:r>
+              <a:rPr lang="en-US" sz="2000" dirty="0" err="1">
+                <a:solidFill>
+                  <a:schemeClr val="bg1"/>
+                </a:solidFill>
+                <a:latin typeface="Book Antiqua" panose="02040602050305030304" pitchFamily="18" charset="0"/>
+                <a:sym typeface="Wingdings" panose="05000000000000000000" pitchFamily="2" charset="2"/>
+              </a:rPr>
+              <a:t>Πολυ</a:t>
+            </a:r>
+            <a:r>
+              <a:rPr lang="en-US" sz="2000" dirty="0">
+                <a:solidFill>
+                  <a:schemeClr val="bg1"/>
+                </a:solidFill>
+                <a:latin typeface="Book Antiqua" panose="02040602050305030304" pitchFamily="18" charset="0"/>
+                <a:sym typeface="Wingdings" panose="05000000000000000000" pitchFamily="2" charset="2"/>
+              </a:rPr>
+              <a:t>πλοκότητα</a:t>
+            </a:r>
+          </a:p>
+          <a:p>
+            <a:pPr indent="-228600" defTabSz="914400">
+              <a:lnSpc>
+                <a:spcPct val="90000"/>
+              </a:lnSpc>
+              <a:spcAft>
+                <a:spcPts val="600"/>
+              </a:spcAft>
+              <a:buFont typeface="Arial" panose="020B0604020202020204" pitchFamily="34" charset="0"/>
+              <a:buChar char="•"/>
+            </a:pPr>
+            <a:endParaRPr lang="en-US" sz="2000" dirty="0">
+              <a:solidFill>
+                <a:schemeClr val="bg1"/>
+              </a:solidFill>
+              <a:latin typeface="Book Antiqua" panose="02040602050305030304" pitchFamily="18" charset="0"/>
+            </a:endParaRPr>
+          </a:p>
+          <a:p>
+            <a:pPr defTabSz="914400">
+              <a:lnSpc>
+                <a:spcPct val="90000"/>
+              </a:lnSpc>
+              <a:spcAft>
+                <a:spcPts val="600"/>
+              </a:spcAft>
+            </a:pPr>
+            <a:r>
+              <a:rPr lang="en-US" sz="2000" b="1" u="sng" dirty="0" err="1">
+                <a:solidFill>
+                  <a:schemeClr val="bg1"/>
+                </a:solidFill>
+                <a:latin typeface="Book Antiqua" panose="02040602050305030304" pitchFamily="18" charset="0"/>
+              </a:rPr>
+              <a:t>Πλεονέκτημ</a:t>
+            </a:r>
+            <a:r>
+              <a:rPr lang="en-US" sz="2000" b="1" u="sng" dirty="0">
+                <a:solidFill>
+                  <a:schemeClr val="bg1"/>
+                </a:solidFill>
+                <a:latin typeface="Book Antiqua" panose="02040602050305030304" pitchFamily="18" charset="0"/>
+              </a:rPr>
+              <a:t>α</a:t>
+            </a:r>
+          </a:p>
+          <a:p>
+            <a:pPr marL="342900" indent="-228600" defTabSz="914400">
+              <a:lnSpc>
+                <a:spcPct val="90000"/>
+              </a:lnSpc>
+              <a:spcAft>
+                <a:spcPts val="600"/>
+              </a:spcAft>
+              <a:buFont typeface="Arial" panose="020B0604020202020204" pitchFamily="34" charset="0"/>
+              <a:buChar char="•"/>
+            </a:pPr>
+            <a:r>
+              <a:rPr lang="en-US" sz="2000" dirty="0">
+                <a:solidFill>
+                  <a:schemeClr val="bg1"/>
+                </a:solidFill>
+                <a:latin typeface="Book Antiqua" panose="02040602050305030304" pitchFamily="18" charset="0"/>
+              </a:rPr>
+              <a:t>Χα</a:t>
+            </a:r>
+            <a:r>
+              <a:rPr lang="en-US" sz="2000" dirty="0" err="1">
+                <a:solidFill>
+                  <a:schemeClr val="bg1"/>
+                </a:solidFill>
+                <a:latin typeface="Book Antiqua" panose="02040602050305030304" pitchFamily="18" charset="0"/>
+              </a:rPr>
+              <a:t>μηλότερες</a:t>
+            </a:r>
+            <a:r>
+              <a:rPr lang="en-US" sz="2000" dirty="0">
+                <a:solidFill>
+                  <a:schemeClr val="bg1"/>
+                </a:solidFill>
+                <a:latin typeface="Book Antiqua" panose="02040602050305030304" pitchFamily="18" charset="0"/>
+              </a:rPr>
+              <a:t> κα</a:t>
+            </a:r>
+            <a:r>
+              <a:rPr lang="en-US" sz="2000" dirty="0" err="1">
+                <a:solidFill>
+                  <a:schemeClr val="bg1"/>
+                </a:solidFill>
+                <a:latin typeface="Book Antiqua" panose="02040602050305030304" pitchFamily="18" charset="0"/>
+              </a:rPr>
+              <a:t>θυστερήσεις</a:t>
+            </a:r>
+            <a:endParaRPr lang="en-US" sz="2000" dirty="0">
+              <a:solidFill>
+                <a:schemeClr val="bg1"/>
+              </a:solidFill>
+              <a:latin typeface="Book Antiqua" panose="02040602050305030304" pitchFamily="18" charset="0"/>
+            </a:endParaRPr>
+          </a:p>
+        </p:txBody>
+      </p:sp>
+    </p:spTree>
+    <p:extLst>
+      <p:ext uri="{BB962C8B-B14F-4D97-AF65-F5344CB8AC3E}">
+        <p14:creationId xmlns:p14="http://schemas.microsoft.com/office/powerpoint/2010/main" val="1383128586"/>
+      </p:ext>
+    </p:extLst>
+  </p:cSld>
+  <p:clrMapOvr>
+    <a:masterClrMapping/>
+  </p:clrMapOvr>
+</p:sld>
+</file>
+
+<file path=ppt/slides/slide5.xml><?xml version="1.0" encoding="utf-8"?>
+<p:sld xmlns:a="http://schemas.openxmlformats.org/drawingml/2006/main" xmlns:r="http://schemas.openxmlformats.org/officeDocument/2006/relationships" xmlns:p="http://schemas.openxmlformats.org/presentationml/2006/main">
+  <p:cSld>
+    <p:spTree>
+      <p:nvGrpSpPr>
+        <p:cNvPr id="1" name=""/>
+        <p:cNvGrpSpPr/>
+        <p:nvPr/>
+      </p:nvGrpSpPr>
+      <p:grpSpPr>
+        <a:xfrm>
+          <a:off x="0" y="0"/>
+          <a:ext cx="0" cy="0"/>
+          <a:chOff x="0" y="0"/>
+          <a:chExt cx="0" cy="0"/>
+        </a:xfrm>
+      </p:grpSpPr>
+      <p:sp>
+        <p:nvSpPr>
+          <p:cNvPr id="2" name="Footer Placeholder 1">
+            <a:extLst>
+              <a:ext uri="{FF2B5EF4-FFF2-40B4-BE49-F238E27FC236}">
+                <a16:creationId xmlns:a16="http://schemas.microsoft.com/office/drawing/2014/main" id="{932DB362-B338-42F3-A51D-D36C34D4ACF9}"/>
+              </a:ext>
+            </a:extLst>
+          </p:cNvPr>
+          <p:cNvSpPr>
+            <a:spLocks noGrp="1"/>
+          </p:cNvSpPr>
+          <p:nvPr>
+            <p:ph type="ftr" sz="quarter" idx="11"/>
+          </p:nvPr>
+        </p:nvSpPr>
+        <p:spPr/>
+        <p:txBody>
+          <a:bodyPr/>
+          <a:lstStyle/>
+          <a:p>
+            <a:endParaRPr lang="en-US"/>
+          </a:p>
+        </p:txBody>
+      </p:sp>
+      <p:sp>
+        <p:nvSpPr>
+          <p:cNvPr id="3" name="Slide Number Placeholder 2">
+            <a:extLst>
+              <a:ext uri="{FF2B5EF4-FFF2-40B4-BE49-F238E27FC236}">
+                <a16:creationId xmlns:a16="http://schemas.microsoft.com/office/drawing/2014/main" id="{7C83CF8F-C1F7-4520-AFA3-2303666ABC10}"/>
+              </a:ext>
+            </a:extLst>
+          </p:cNvPr>
+          <p:cNvSpPr>
+            <a:spLocks noGrp="1"/>
+          </p:cNvSpPr>
+          <p:nvPr>
+            <p:ph type="sldNum" sz="quarter" idx="12"/>
+          </p:nvPr>
+        </p:nvSpPr>
+        <p:spPr/>
+        <p:txBody>
+          <a:bodyPr/>
+          <a:lstStyle/>
+          <a:p>
+            <a:fld id="{8FCAAC12-ECE3-429D-A5B3-AAB453D53177}" type="slidenum">
+              <a:rPr lang="en-US" smtClean="0"/>
+              <a:t>5</a:t>
+            </a:fld>
+            <a:endParaRPr lang="en-US"/>
+          </a:p>
+        </p:txBody>
+      </p:sp>
+      <p:sp>
+        <p:nvSpPr>
+          <p:cNvPr id="4" name="TextBox 3">
+            <a:extLst>
+              <a:ext uri="{FF2B5EF4-FFF2-40B4-BE49-F238E27FC236}">
+                <a16:creationId xmlns:a16="http://schemas.microsoft.com/office/drawing/2014/main" id="{481DC589-82C0-41D7-812A-A6DC28B6A70C}"/>
+              </a:ext>
+            </a:extLst>
+          </p:cNvPr>
+          <p:cNvSpPr txBox="1"/>
+          <p:nvPr/>
+        </p:nvSpPr>
+        <p:spPr>
+          <a:xfrm>
+            <a:off x="2545023" y="237284"/>
+            <a:ext cx="7101953" cy="400110"/>
+          </a:xfrm>
+          <a:prstGeom prst="rect">
+            <a:avLst/>
+          </a:prstGeom>
+          <a:solidFill>
+            <a:srgbClr val="292929"/>
+          </a:solidFill>
+        </p:spPr>
+        <p:txBody>
+          <a:bodyPr wrap="square" rtlCol="0">
+            <a:spAutoFit/>
+          </a:bodyPr>
+          <a:lstStyle/>
+          <a:p>
+            <a:pPr algn="ctr"/>
+            <a:r>
+              <a:rPr lang="el-GR" sz="2000" b="1" dirty="0">
+                <a:solidFill>
+                  <a:schemeClr val="bg1"/>
+                </a:solidFill>
+                <a:latin typeface="Book Antiqua" panose="02040602050305030304" pitchFamily="18" charset="0"/>
+              </a:rPr>
+              <a:t>Πρόβλεψη των κρατουμένων</a:t>
+            </a:r>
+            <a:endParaRPr lang="en-US" sz="2000" b="1" dirty="0">
+              <a:solidFill>
+                <a:schemeClr val="bg1"/>
+              </a:solidFill>
+              <a:latin typeface="Book Antiqua" panose="02040602050305030304" pitchFamily="18" charset="0"/>
+            </a:endParaRPr>
+          </a:p>
+        </p:txBody>
+      </p:sp>
+      <p:pic>
+        <p:nvPicPr>
+          <p:cNvPr id="6" name="Picture 5" descr="A close up of a logo&#10;&#10;Description generated with high confidence">
+            <a:extLst>
+              <a:ext uri="{FF2B5EF4-FFF2-40B4-BE49-F238E27FC236}">
+                <a16:creationId xmlns:a16="http://schemas.microsoft.com/office/drawing/2014/main" id="{346F4B38-71B2-4F90-97FD-9F52049C1B25}"/>
+              </a:ext>
+            </a:extLst>
+          </p:cNvPr>
+          <p:cNvPicPr>
+            <a:picLocks noChangeAspect="1"/>
+          </p:cNvPicPr>
+          <p:nvPr/>
+        </p:nvPicPr>
+        <p:blipFill>
+          <a:blip r:embed="rId2">
+            <a:extLst>
+              <a:ext uri="{28A0092B-C50C-407E-A947-70E740481C1C}">
+                <a14:useLocalDpi xmlns:a14="http://schemas.microsoft.com/office/drawing/2010/main" val="0"/>
+              </a:ext>
+            </a:extLst>
+          </a:blip>
+          <a:stretch>
+            <a:fillRect/>
+          </a:stretch>
+        </p:blipFill>
+        <p:spPr>
+          <a:xfrm>
+            <a:off x="6522097" y="2860591"/>
+            <a:ext cx="4837356" cy="1357502"/>
+          </a:xfrm>
+          <a:prstGeom prst="rect">
+            <a:avLst/>
+          </a:prstGeom>
+        </p:spPr>
+      </p:pic>
+      <p:pic>
+        <p:nvPicPr>
+          <p:cNvPr id="7" name="Picture 6" descr="A screenshot of a video game&#10;&#10;Description generated with high confidence">
+            <a:extLst>
+              <a:ext uri="{FF2B5EF4-FFF2-40B4-BE49-F238E27FC236}">
+                <a16:creationId xmlns:a16="http://schemas.microsoft.com/office/drawing/2014/main" id="{95353D48-3C24-4BCA-9A78-788D182AE96B}"/>
+              </a:ext>
+            </a:extLst>
+          </p:cNvPr>
+          <p:cNvPicPr>
+            <a:picLocks noChangeAspect="1"/>
+          </p:cNvPicPr>
+          <p:nvPr/>
+        </p:nvPicPr>
+        <p:blipFill>
+          <a:blip r:embed="rId3">
+            <a:extLst>
+              <a:ext uri="{28A0092B-C50C-407E-A947-70E740481C1C}">
+                <a14:useLocalDpi xmlns:a14="http://schemas.microsoft.com/office/drawing/2010/main" val="0"/>
+              </a:ext>
+            </a:extLst>
+          </a:blip>
+          <a:stretch>
+            <a:fillRect/>
+          </a:stretch>
+        </p:blipFill>
+        <p:spPr>
+          <a:xfrm>
+            <a:off x="475441" y="1058462"/>
+            <a:ext cx="5091823" cy="1357502"/>
+          </a:xfrm>
+          <a:prstGeom prst="rect">
+            <a:avLst/>
+          </a:prstGeom>
+        </p:spPr>
+      </p:pic>
+      <p:pic>
+        <p:nvPicPr>
+          <p:cNvPr id="9" name="Picture 8" descr="A close up of text on a white background&#10;&#10;Description generated with very high confidence">
+            <a:extLst>
+              <a:ext uri="{FF2B5EF4-FFF2-40B4-BE49-F238E27FC236}">
+                <a16:creationId xmlns:a16="http://schemas.microsoft.com/office/drawing/2014/main" id="{64311D7E-14F0-4AB7-A2B5-CF12EA4F8D58}"/>
+              </a:ext>
+            </a:extLst>
+          </p:cNvPr>
+          <p:cNvPicPr>
+            <a:picLocks noChangeAspect="1"/>
+          </p:cNvPicPr>
+          <p:nvPr/>
+        </p:nvPicPr>
+        <p:blipFill>
+          <a:blip r:embed="rId4">
+            <a:extLst>
+              <a:ext uri="{28A0092B-C50C-407E-A947-70E740481C1C}">
+                <a14:useLocalDpi xmlns:a14="http://schemas.microsoft.com/office/drawing/2010/main" val="0"/>
+              </a:ext>
+            </a:extLst>
+          </a:blip>
+          <a:stretch>
+            <a:fillRect/>
+          </a:stretch>
+        </p:blipFill>
+        <p:spPr>
+          <a:xfrm>
+            <a:off x="1908815" y="2915141"/>
+            <a:ext cx="2225073" cy="2265082"/>
+          </a:xfrm>
+          <a:prstGeom prst="rect">
+            <a:avLst/>
+          </a:prstGeom>
+        </p:spPr>
+      </p:pic>
+    </p:spTree>
+    <p:extLst>
+      <p:ext uri="{BB962C8B-B14F-4D97-AF65-F5344CB8AC3E}">
+        <p14:creationId xmlns:p14="http://schemas.microsoft.com/office/powerpoint/2010/main" val="544445628"/>
+      </p:ext>
+    </p:extLst>
+  </p:cSld>
+  <p:clrMapOvr>
+    <a:masterClrMapping/>
+  </p:clrMapOvr>
+</p:sld>
+</file>
+
+<file path=ppt/slides/slide6.xml><?xml version="1.0" encoding="utf-8"?>
+<p:sld xmlns:a="http://schemas.openxmlformats.org/drawingml/2006/main" xmlns:r="http://schemas.openxmlformats.org/officeDocument/2006/relationships" xmlns:p="http://schemas.openxmlformats.org/presentationml/2006/main">
+  <p:cSld>
+    <p:spTree>
+      <p:nvGrpSpPr>
+        <p:cNvPr id="1" name=""/>
+        <p:cNvGrpSpPr/>
+        <p:nvPr/>
+      </p:nvGrpSpPr>
+      <p:grpSpPr>
+        <a:xfrm>
+          <a:off x="0" y="0"/>
+          <a:ext cx="0" cy="0"/>
+          <a:chOff x="0" y="0"/>
+          <a:chExt cx="0" cy="0"/>
+        </a:xfrm>
+      </p:grpSpPr>
+      <p:sp>
+        <p:nvSpPr>
+          <p:cNvPr id="4" name="TextBox 3">
+            <a:extLst>
+              <a:ext uri="{FF2B5EF4-FFF2-40B4-BE49-F238E27FC236}">
+                <a16:creationId xmlns:a16="http://schemas.microsoft.com/office/drawing/2014/main" id="{D8745CE7-6820-43B6-9304-69F7A18105C8}"/>
+              </a:ext>
+            </a:extLst>
+          </p:cNvPr>
+          <p:cNvSpPr txBox="1"/>
+          <p:nvPr/>
+        </p:nvSpPr>
+        <p:spPr>
+          <a:xfrm>
+            <a:off x="3996707" y="523875"/>
+            <a:ext cx="4198585" cy="369332"/>
+          </a:xfrm>
+          <a:prstGeom prst="rect">
+            <a:avLst/>
+          </a:prstGeom>
+          <a:noFill/>
+        </p:spPr>
+        <p:txBody>
+          <a:bodyPr wrap="none" rtlCol="0">
+            <a:spAutoFit/>
+          </a:bodyPr>
+          <a:lstStyle/>
+          <a:p>
+            <a:r>
+              <a:rPr lang="el-GR" dirty="0">
+                <a:latin typeface="Book Antiqua" panose="02040602050305030304" pitchFamily="18" charset="0"/>
+              </a:rPr>
+              <a:t>Αθροιστές Προθέματος – </a:t>
+            </a:r>
+            <a:r>
+              <a:rPr lang="en-US" dirty="0">
+                <a:latin typeface="Book Antiqua" panose="02040602050305030304" pitchFamily="18" charset="0"/>
+              </a:rPr>
+              <a:t>Prefix Adders</a:t>
+            </a:r>
+          </a:p>
+        </p:txBody>
+      </p:sp>
+      <p:pic>
+        <p:nvPicPr>
+          <p:cNvPr id="6" name="Picture 5" descr="A close up of a clock&#10;&#10;Description generated with high confidence">
+            <a:extLst>
+              <a:ext uri="{FF2B5EF4-FFF2-40B4-BE49-F238E27FC236}">
+                <a16:creationId xmlns:a16="http://schemas.microsoft.com/office/drawing/2014/main" id="{205AB0B4-F9B0-4FD1-8508-61D941789737}"/>
+              </a:ext>
+            </a:extLst>
+          </p:cNvPr>
+          <p:cNvPicPr>
+            <a:picLocks noChangeAspect="1"/>
+          </p:cNvPicPr>
+          <p:nvPr/>
+        </p:nvPicPr>
+        <p:blipFill>
+          <a:blip r:embed="rId2">
+            <a:extLst>
+              <a:ext uri="{28A0092B-C50C-407E-A947-70E740481C1C}">
+                <a14:useLocalDpi xmlns:a14="http://schemas.microsoft.com/office/drawing/2010/main" val="0"/>
+              </a:ext>
+            </a:extLst>
+          </a:blip>
+          <a:stretch>
+            <a:fillRect/>
+          </a:stretch>
+        </p:blipFill>
+        <p:spPr>
+          <a:xfrm>
+            <a:off x="9205173" y="4243209"/>
+            <a:ext cx="1973151" cy="1757542"/>
+          </a:xfrm>
+          <a:prstGeom prst="rect">
+            <a:avLst/>
+          </a:prstGeom>
+        </p:spPr>
+      </p:pic>
+      <p:pic>
+        <p:nvPicPr>
+          <p:cNvPr id="8" name="Picture 7" descr="A drawing of a person&#10;&#10;Description generated with high confidence">
+            <a:extLst>
+              <a:ext uri="{FF2B5EF4-FFF2-40B4-BE49-F238E27FC236}">
+                <a16:creationId xmlns:a16="http://schemas.microsoft.com/office/drawing/2014/main" id="{C4336761-00DD-4CB4-BAF1-83D8DB7F9A5A}"/>
+              </a:ext>
+            </a:extLst>
+          </p:cNvPr>
+          <p:cNvPicPr>
+            <a:picLocks noChangeAspect="1"/>
+          </p:cNvPicPr>
+          <p:nvPr/>
+        </p:nvPicPr>
+        <p:blipFill>
+          <a:blip r:embed="rId3">
+            <a:extLst>
+              <a:ext uri="{28A0092B-C50C-407E-A947-70E740481C1C}">
+                <a14:useLocalDpi xmlns:a14="http://schemas.microsoft.com/office/drawing/2010/main" val="0"/>
+              </a:ext>
+            </a:extLst>
+          </a:blip>
+          <a:stretch>
+            <a:fillRect/>
+          </a:stretch>
+        </p:blipFill>
+        <p:spPr>
+          <a:xfrm>
+            <a:off x="9773807" y="1221344"/>
+            <a:ext cx="835881" cy="2407681"/>
+          </a:xfrm>
+          <a:prstGeom prst="rect">
+            <a:avLst/>
+          </a:prstGeom>
+        </p:spPr>
+      </p:pic>
+      <mc:AlternateContent xmlns:mc="http://schemas.openxmlformats.org/markup-compatibility/2006">
+        <mc:Choice xmlns:a14="http://schemas.microsoft.com/office/drawing/2010/main" Requires="a14">
+          <p:sp>
+            <p:nvSpPr>
+              <p:cNvPr id="11" name="TextBox 10">
+                <a:extLst>
+                  <a:ext uri="{FF2B5EF4-FFF2-40B4-BE49-F238E27FC236}">
+                    <a16:creationId xmlns:a16="http://schemas.microsoft.com/office/drawing/2014/main" id="{D66A0400-E787-4B57-8B88-D164561E7746}"/>
+                  </a:ext>
+                </a:extLst>
+              </p:cNvPr>
+              <p:cNvSpPr txBox="1"/>
+              <p:nvPr/>
+            </p:nvSpPr>
+            <p:spPr>
+              <a:xfrm>
+                <a:off x="1808679" y="2875002"/>
+                <a:ext cx="3568285" cy="553998"/>
+              </a:xfrm>
+              <a:prstGeom prst="rect">
+                <a:avLst/>
+              </a:prstGeom>
+              <a:noFill/>
+            </p:spPr>
+            <p:txBody>
+              <a:bodyPr wrap="none" lIns="0" tIns="0" rIns="0" bIns="0" rtlCol="0">
+                <a:spAutoFit/>
+              </a:bodyPr>
+              <a:lstStyle/>
+              <a:p>
+                <a14:m>
+                  <m:oMath xmlns:m="http://schemas.openxmlformats.org/officeDocument/2006/math">
+                    <m:d>
+                      <m:dPr>
+                        <m:ctrlPr>
+                          <a:rPr lang="en-US" b="0" i="1" smtClean="0">
+                            <a:latin typeface="Cambria Math" panose="02040503050406030204" pitchFamily="18" charset="0"/>
+                            <a:ea typeface="Cambria Math" panose="02040503050406030204" pitchFamily="18" charset="0"/>
+                          </a:rPr>
+                        </m:ctrlPr>
+                      </m:dPr>
+                      <m:e>
+                        <m:r>
+                          <a:rPr lang="en-US" b="0" i="1" smtClean="0">
+                            <a:latin typeface="Cambria Math" panose="02040503050406030204" pitchFamily="18" charset="0"/>
+                            <a:ea typeface="Cambria Math" panose="02040503050406030204" pitchFamily="18" charset="0"/>
+                          </a:rPr>
+                          <m:t>𝑔</m:t>
+                        </m:r>
+                        <m:r>
+                          <a:rPr lang="en-US" b="0" i="1" baseline="-25000" smtClean="0">
+                            <a:latin typeface="Cambria Math" panose="02040503050406030204" pitchFamily="18" charset="0"/>
+                            <a:ea typeface="Cambria Math" panose="02040503050406030204" pitchFamily="18" charset="0"/>
+                          </a:rPr>
+                          <m:t>𝑖</m:t>
+                        </m:r>
+                        <m:r>
+                          <a:rPr lang="en-US" b="0" i="1" smtClean="0">
+                            <a:latin typeface="Cambria Math" panose="02040503050406030204" pitchFamily="18" charset="0"/>
+                            <a:ea typeface="Cambria Math" panose="02040503050406030204" pitchFamily="18" charset="0"/>
+                          </a:rPr>
+                          <m:t>𝑝</m:t>
+                        </m:r>
+                        <m:r>
+                          <a:rPr lang="en-US" b="0" i="1" baseline="-25000" smtClean="0">
+                            <a:latin typeface="Cambria Math" panose="02040503050406030204" pitchFamily="18" charset="0"/>
+                            <a:ea typeface="Cambria Math" panose="02040503050406030204" pitchFamily="18" charset="0"/>
+                          </a:rPr>
+                          <m:t>𝑖</m:t>
+                        </m:r>
+                      </m:e>
+                    </m:d>
+                    <m:r>
+                      <a:rPr lang="en-US" b="0" i="1" smtClean="0">
+                        <a:latin typeface="Cambria Math" panose="02040503050406030204" pitchFamily="18" charset="0"/>
+                        <a:ea typeface="Cambria Math" panose="02040503050406030204" pitchFamily="18" charset="0"/>
+                      </a:rPr>
+                      <m:t>  ⊛(</m:t>
+                    </m:r>
+                    <m:r>
+                      <a:rPr lang="en-US" b="0" i="1" smtClean="0">
+                        <a:latin typeface="Cambria Math" panose="02040503050406030204" pitchFamily="18" charset="0"/>
+                        <a:ea typeface="Cambria Math" panose="02040503050406030204" pitchFamily="18" charset="0"/>
+                      </a:rPr>
+                      <m:t>𝑔𝑘</m:t>
+                    </m:r>
+                    <m:r>
+                      <a:rPr lang="en-US" b="0" i="1" smtClean="0">
+                        <a:latin typeface="Cambria Math" panose="02040503050406030204" pitchFamily="18" charset="0"/>
+                        <a:ea typeface="Cambria Math" panose="02040503050406030204" pitchFamily="18" charset="0"/>
+                      </a:rPr>
+                      <m:t>,</m:t>
+                    </m:r>
+                    <m:r>
+                      <a:rPr lang="en-US" b="0" i="1" smtClean="0">
+                        <a:latin typeface="Cambria Math" panose="02040503050406030204" pitchFamily="18" charset="0"/>
+                        <a:ea typeface="Cambria Math" panose="02040503050406030204" pitchFamily="18" charset="0"/>
+                      </a:rPr>
+                      <m:t>𝑝𝑘</m:t>
+                    </m:r>
+                  </m:oMath>
+                </a14:m>
+                <a:r>
+                  <a:rPr lang="en-US" dirty="0">
+                    <a:latin typeface="Cambria Math" panose="02040503050406030204" pitchFamily="18" charset="0"/>
+                    <a:ea typeface="Cambria Math" panose="02040503050406030204" pitchFamily="18" charset="0"/>
+                  </a:rPr>
+                  <a:t>)  = (</a:t>
+                </a:r>
+                <a:r>
+                  <a:rPr lang="en-US" dirty="0" err="1">
+                    <a:latin typeface="Cambria Math" panose="02040503050406030204" pitchFamily="18" charset="0"/>
+                    <a:ea typeface="Cambria Math" panose="02040503050406030204" pitchFamily="18" charset="0"/>
+                  </a:rPr>
+                  <a:t>g</a:t>
+                </a:r>
+                <a:r>
+                  <a:rPr lang="en-US" baseline="-25000" dirty="0" err="1">
+                    <a:latin typeface="Cambria Math" panose="02040503050406030204" pitchFamily="18" charset="0"/>
+                    <a:ea typeface="Cambria Math" panose="02040503050406030204" pitchFamily="18" charset="0"/>
+                  </a:rPr>
+                  <a:t>i</a:t>
+                </a:r>
+                <a:r>
+                  <a:rPr lang="en-US" dirty="0">
+                    <a:latin typeface="Cambria Math" panose="02040503050406030204" pitchFamily="18" charset="0"/>
+                    <a:ea typeface="Cambria Math" panose="02040503050406030204" pitchFamily="18" charset="0"/>
+                  </a:rPr>
+                  <a:t> + </a:t>
+                </a:r>
+                <a:r>
+                  <a:rPr lang="en-US" dirty="0" err="1">
+                    <a:latin typeface="Cambria Math" panose="02040503050406030204" pitchFamily="18" charset="0"/>
+                    <a:ea typeface="Cambria Math" panose="02040503050406030204" pitchFamily="18" charset="0"/>
+                  </a:rPr>
+                  <a:t>p</a:t>
+                </a:r>
+                <a:r>
+                  <a:rPr lang="en-US" baseline="-25000" dirty="0" err="1">
+                    <a:latin typeface="Cambria Math" panose="02040503050406030204" pitchFamily="18" charset="0"/>
+                    <a:ea typeface="Cambria Math" panose="02040503050406030204" pitchFamily="18" charset="0"/>
+                  </a:rPr>
+                  <a:t>i</a:t>
+                </a:r>
+                <a:r>
+                  <a:rPr lang="en-US" dirty="0" err="1">
+                    <a:latin typeface="Cambria Math" panose="02040503050406030204" pitchFamily="18" charset="0"/>
+                    <a:ea typeface="Cambria Math" panose="02040503050406030204" pitchFamily="18" charset="0"/>
+                  </a:rPr>
+                  <a:t>g</a:t>
+                </a:r>
+                <a:r>
+                  <a:rPr lang="en-US" baseline="-25000" dirty="0" err="1">
+                    <a:latin typeface="Cambria Math" panose="02040503050406030204" pitchFamily="18" charset="0"/>
+                    <a:ea typeface="Cambria Math" panose="02040503050406030204" pitchFamily="18" charset="0"/>
+                  </a:rPr>
+                  <a:t>k</a:t>
+                </a:r>
+                <a:r>
+                  <a:rPr lang="en-US" dirty="0">
+                    <a:latin typeface="Cambria Math" panose="02040503050406030204" pitchFamily="18" charset="0"/>
+                    <a:ea typeface="Cambria Math" panose="02040503050406030204" pitchFamily="18" charset="0"/>
+                  </a:rPr>
+                  <a:t>, </a:t>
+                </a:r>
+                <a:r>
+                  <a:rPr lang="en-US" dirty="0" err="1">
+                    <a:latin typeface="Cambria Math" panose="02040503050406030204" pitchFamily="18" charset="0"/>
+                    <a:ea typeface="Cambria Math" panose="02040503050406030204" pitchFamily="18" charset="0"/>
+                  </a:rPr>
+                  <a:t>p</a:t>
+                </a:r>
+                <a:r>
+                  <a:rPr lang="en-US" baseline="-25000" dirty="0" err="1">
+                    <a:latin typeface="Cambria Math" panose="02040503050406030204" pitchFamily="18" charset="0"/>
+                    <a:ea typeface="Cambria Math" panose="02040503050406030204" pitchFamily="18" charset="0"/>
+                  </a:rPr>
+                  <a:t>i</a:t>
+                </a:r>
+                <a:r>
+                  <a:rPr lang="en-US" dirty="0" err="1">
+                    <a:latin typeface="Cambria Math" panose="02040503050406030204" pitchFamily="18" charset="0"/>
+                    <a:ea typeface="Cambria Math" panose="02040503050406030204" pitchFamily="18" charset="0"/>
+                  </a:rPr>
+                  <a:t>p</a:t>
+                </a:r>
+                <a:r>
+                  <a:rPr lang="en-US" baseline="-25000" dirty="0" err="1">
+                    <a:latin typeface="Cambria Math" panose="02040503050406030204" pitchFamily="18" charset="0"/>
+                    <a:ea typeface="Cambria Math" panose="02040503050406030204" pitchFamily="18" charset="0"/>
+                  </a:rPr>
+                  <a:t>k</a:t>
+                </a:r>
+                <a:r>
+                  <a:rPr lang="en-US" dirty="0">
+                    <a:latin typeface="Cambria Math" panose="02040503050406030204" pitchFamily="18" charset="0"/>
+                    <a:ea typeface="Cambria Math" panose="02040503050406030204" pitchFamily="18" charset="0"/>
+                  </a:rPr>
+                  <a:t>)</a:t>
+                </a:r>
+              </a:p>
+              <a:p>
+                <a:r>
+                  <a:rPr lang="en-US" dirty="0">
+                    <a:latin typeface="Cambria Math" panose="02040503050406030204" pitchFamily="18" charset="0"/>
+                    <a:ea typeface="Cambria Math" panose="02040503050406030204" pitchFamily="18" charset="0"/>
+                  </a:rPr>
+                  <a:t>(G</a:t>
+                </a:r>
+                <a:r>
+                  <a:rPr lang="en-US" baseline="-25000" dirty="0">
+                    <a:latin typeface="Cambria Math" panose="02040503050406030204" pitchFamily="18" charset="0"/>
+                    <a:ea typeface="Cambria Math" panose="02040503050406030204" pitchFamily="18" charset="0"/>
+                  </a:rPr>
+                  <a:t>i</a:t>
+                </a:r>
+                <a:r>
+                  <a:rPr lang="en-US" dirty="0">
+                    <a:latin typeface="Cambria Math" panose="02040503050406030204" pitchFamily="18" charset="0"/>
+                    <a:ea typeface="Cambria Math" panose="02040503050406030204" pitchFamily="18" charset="0"/>
+                  </a:rPr>
+                  <a:t>, P</a:t>
+                </a:r>
+                <a:r>
+                  <a:rPr lang="en-US" baseline="-25000" dirty="0">
+                    <a:latin typeface="Cambria Math" panose="02040503050406030204" pitchFamily="18" charset="0"/>
+                    <a:ea typeface="Cambria Math" panose="02040503050406030204" pitchFamily="18" charset="0"/>
+                  </a:rPr>
+                  <a:t>i</a:t>
+                </a:r>
+                <a:r>
+                  <a:rPr lang="en-US" dirty="0">
+                    <a:latin typeface="Cambria Math" panose="02040503050406030204" pitchFamily="18" charset="0"/>
+                    <a:ea typeface="Cambria Math" panose="02040503050406030204" pitchFamily="18" charset="0"/>
+                  </a:rPr>
+                  <a:t>) </a:t>
+                </a:r>
+                <a14:m>
+                  <m:oMath xmlns:m="http://schemas.openxmlformats.org/officeDocument/2006/math">
+                    <m:r>
+                      <a:rPr lang="en-US" i="1">
+                        <a:latin typeface="Cambria Math" panose="02040503050406030204" pitchFamily="18" charset="0"/>
+                        <a:ea typeface="Cambria Math" panose="02040503050406030204" pitchFamily="18" charset="0"/>
+                      </a:rPr>
+                      <m:t>⊛</m:t>
+                    </m:r>
+                  </m:oMath>
+                </a14:m>
+                <a:r>
+                  <a:rPr lang="en-US" dirty="0">
+                    <a:latin typeface="Cambria Math" panose="02040503050406030204" pitchFamily="18" charset="0"/>
+                    <a:ea typeface="Cambria Math" panose="02040503050406030204" pitchFamily="18" charset="0"/>
+                  </a:rPr>
+                  <a:t> (</a:t>
+                </a:r>
+                <a:r>
+                  <a:rPr lang="en-US" dirty="0" err="1">
+                    <a:latin typeface="Cambria Math" panose="02040503050406030204" pitchFamily="18" charset="0"/>
+                    <a:ea typeface="Cambria Math" panose="02040503050406030204" pitchFamily="18" charset="0"/>
+                  </a:rPr>
+                  <a:t>G</a:t>
+                </a:r>
+                <a:r>
+                  <a:rPr lang="en-US" baseline="-25000" dirty="0" err="1">
+                    <a:latin typeface="Cambria Math" panose="02040503050406030204" pitchFamily="18" charset="0"/>
+                    <a:ea typeface="Cambria Math" panose="02040503050406030204" pitchFamily="18" charset="0"/>
+                  </a:rPr>
+                  <a:t>k</a:t>
+                </a:r>
+                <a:r>
+                  <a:rPr lang="en-US" dirty="0">
+                    <a:latin typeface="Cambria Math" panose="02040503050406030204" pitchFamily="18" charset="0"/>
+                    <a:ea typeface="Cambria Math" panose="02040503050406030204" pitchFamily="18" charset="0"/>
+                  </a:rPr>
+                  <a:t>, </a:t>
+                </a:r>
+                <a:r>
+                  <a:rPr lang="en-US" dirty="0" err="1">
+                    <a:latin typeface="Cambria Math" panose="02040503050406030204" pitchFamily="18" charset="0"/>
+                    <a:ea typeface="Cambria Math" panose="02040503050406030204" pitchFamily="18" charset="0"/>
+                  </a:rPr>
+                  <a:t>P</a:t>
+                </a:r>
+                <a:r>
+                  <a:rPr lang="en-US" baseline="-25000" dirty="0" err="1">
+                    <a:latin typeface="Cambria Math" panose="02040503050406030204" pitchFamily="18" charset="0"/>
+                    <a:ea typeface="Cambria Math" panose="02040503050406030204" pitchFamily="18" charset="0"/>
+                  </a:rPr>
+                  <a:t>k</a:t>
+                </a:r>
+                <a:r>
+                  <a:rPr lang="en-US" dirty="0">
+                    <a:latin typeface="Cambria Math" panose="02040503050406030204" pitchFamily="18" charset="0"/>
+                    <a:ea typeface="Cambria Math" panose="02040503050406030204" pitchFamily="18" charset="0"/>
+                  </a:rPr>
+                  <a:t>)  = (G</a:t>
+                </a:r>
+                <a:r>
+                  <a:rPr lang="en-US" baseline="-25000" dirty="0">
+                    <a:latin typeface="Cambria Math" panose="02040503050406030204" pitchFamily="18" charset="0"/>
+                    <a:ea typeface="Cambria Math" panose="02040503050406030204" pitchFamily="18" charset="0"/>
+                  </a:rPr>
+                  <a:t>i</a:t>
+                </a:r>
+                <a:r>
+                  <a:rPr lang="en-US" dirty="0">
+                    <a:latin typeface="Cambria Math" panose="02040503050406030204" pitchFamily="18" charset="0"/>
+                    <a:ea typeface="Cambria Math" panose="02040503050406030204" pitchFamily="18" charset="0"/>
+                  </a:rPr>
+                  <a:t> + </a:t>
+                </a:r>
+                <a:r>
+                  <a:rPr lang="en-US" dirty="0" err="1">
+                    <a:latin typeface="Cambria Math" panose="02040503050406030204" pitchFamily="18" charset="0"/>
+                    <a:ea typeface="Cambria Math" panose="02040503050406030204" pitchFamily="18" charset="0"/>
+                  </a:rPr>
+                  <a:t>P</a:t>
+                </a:r>
+                <a:r>
+                  <a:rPr lang="en-US" baseline="-25000" dirty="0" err="1">
+                    <a:latin typeface="Cambria Math" panose="02040503050406030204" pitchFamily="18" charset="0"/>
+                    <a:ea typeface="Cambria Math" panose="02040503050406030204" pitchFamily="18" charset="0"/>
+                  </a:rPr>
+                  <a:t>i</a:t>
+                </a:r>
+                <a:r>
+                  <a:rPr lang="en-US" dirty="0" err="1">
+                    <a:latin typeface="Cambria Math" panose="02040503050406030204" pitchFamily="18" charset="0"/>
+                    <a:ea typeface="Cambria Math" panose="02040503050406030204" pitchFamily="18" charset="0"/>
+                  </a:rPr>
+                  <a:t>G</a:t>
+                </a:r>
+                <a:r>
+                  <a:rPr lang="en-US" baseline="-25000" dirty="0" err="1">
+                    <a:latin typeface="Cambria Math" panose="02040503050406030204" pitchFamily="18" charset="0"/>
+                    <a:ea typeface="Cambria Math" panose="02040503050406030204" pitchFamily="18" charset="0"/>
+                  </a:rPr>
+                  <a:t>k</a:t>
+                </a:r>
+                <a:r>
+                  <a:rPr lang="en-US" dirty="0">
+                    <a:latin typeface="Cambria Math" panose="02040503050406030204" pitchFamily="18" charset="0"/>
+                    <a:ea typeface="Cambria Math" panose="02040503050406030204" pitchFamily="18" charset="0"/>
+                  </a:rPr>
+                  <a:t>, </a:t>
+                </a:r>
+                <a:r>
+                  <a:rPr lang="en-US" dirty="0" err="1">
+                    <a:latin typeface="Cambria Math" panose="02040503050406030204" pitchFamily="18" charset="0"/>
+                    <a:ea typeface="Cambria Math" panose="02040503050406030204" pitchFamily="18" charset="0"/>
+                  </a:rPr>
+                  <a:t>P</a:t>
+                </a:r>
+                <a:r>
+                  <a:rPr lang="en-US" baseline="-25000" dirty="0" err="1">
+                    <a:latin typeface="Cambria Math" panose="02040503050406030204" pitchFamily="18" charset="0"/>
+                    <a:ea typeface="Cambria Math" panose="02040503050406030204" pitchFamily="18" charset="0"/>
+                  </a:rPr>
+                  <a:t>i</a:t>
+                </a:r>
+                <a:r>
+                  <a:rPr lang="en-US" dirty="0" err="1">
+                    <a:latin typeface="Cambria Math" panose="02040503050406030204" pitchFamily="18" charset="0"/>
+                    <a:ea typeface="Cambria Math" panose="02040503050406030204" pitchFamily="18" charset="0"/>
+                  </a:rPr>
+                  <a:t>P</a:t>
+                </a:r>
+                <a:r>
+                  <a:rPr lang="en-US" baseline="-25000" dirty="0" err="1">
+                    <a:latin typeface="Cambria Math" panose="02040503050406030204" pitchFamily="18" charset="0"/>
+                    <a:ea typeface="Cambria Math" panose="02040503050406030204" pitchFamily="18" charset="0"/>
+                  </a:rPr>
+                  <a:t>k</a:t>
+                </a:r>
+                <a:r>
+                  <a:rPr lang="en-US" dirty="0">
+                    <a:latin typeface="Cambria Math" panose="02040503050406030204" pitchFamily="18" charset="0"/>
+                    <a:ea typeface="Cambria Math" panose="02040503050406030204" pitchFamily="18" charset="0"/>
+                  </a:rPr>
+                  <a:t>)</a:t>
+                </a:r>
+              </a:p>
+            </p:txBody>
+          </p:sp>
+        </mc:Choice>
+        <mc:Fallback>
+          <p:sp>
+            <p:nvSpPr>
+              <p:cNvPr id="11" name="TextBox 10">
+                <a:extLst>
+                  <a:ext uri="{FF2B5EF4-FFF2-40B4-BE49-F238E27FC236}">
+                    <a16:creationId xmlns:a16="http://schemas.microsoft.com/office/drawing/2014/main" id="{D66A0400-E787-4B57-8B88-D164561E7746}"/>
+                  </a:ext>
+                </a:extLst>
+              </p:cNvPr>
+              <p:cNvSpPr txBox="1">
+                <a:spLocks noRot="1" noChangeAspect="1" noMove="1" noResize="1" noEditPoints="1" noAdjustHandles="1" noChangeArrowheads="1" noChangeShapeType="1" noTextEdit="1"/>
+              </p:cNvSpPr>
+              <p:nvPr/>
+            </p:nvSpPr>
+            <p:spPr>
+              <a:xfrm>
+                <a:off x="1808679" y="2875002"/>
+                <a:ext cx="3568285" cy="553998"/>
+              </a:xfrm>
+              <a:prstGeom prst="rect">
+                <a:avLst/>
+              </a:prstGeom>
+              <a:blipFill>
+                <a:blip r:embed="rId4"/>
+                <a:stretch>
+                  <a:fillRect l="-4103" t="-15385" r="-3248" b="-23077"/>
+                </a:stretch>
+              </a:blipFill>
+            </p:spPr>
+            <p:txBody>
+              <a:bodyPr/>
+              <a:lstStyle/>
+              <a:p>
+                <a:r>
+                  <a:rPr lang="en-US">
+                    <a:noFill/>
+                  </a:rPr>
+                  <a:t> </a:t>
+                </a:r>
+              </a:p>
+            </p:txBody>
+          </p:sp>
+        </mc:Fallback>
+      </mc:AlternateContent>
+    </p:spTree>
+    <p:extLst>
+      <p:ext uri="{BB962C8B-B14F-4D97-AF65-F5344CB8AC3E}">
+        <p14:creationId xmlns:p14="http://schemas.microsoft.com/office/powerpoint/2010/main" val="2293765231"/>
+      </p:ext>
+    </p:extLst>
+  </p:cSld>
+  <p:clrMapOvr>
+    <a:masterClrMapping/>
+  </p:clrMapOvr>
+</p:sld>
+</file>
+
 <file path=ppt/theme/theme1.xml><?xml version="1.0" encoding="utf-8"?>
 <a:theme xmlns:a="http://schemas.openxmlformats.org/drawingml/2006/main" name="Office Theme">
   <a:themeElements>
-    <a:clrScheme name="Office">
+    <a:clrScheme name="Office Theme">
       <a:dk1>
         <a:sysClr val="windowText" lastClr="000000"/>
       </a:dk1>
@@ -4235,7 +5825,7 @@
         <a:srgbClr val="954F72"/>
       </a:folHlink>
     </a:clrScheme>
-    <a:fontScheme name="Office">
+    <a:fontScheme name="Office Theme">
       <a:majorFont>
         <a:latin typeface="Calibri Light" panose="020F0302020204030204"/>
         <a:ea typeface=""/>
@@ -4270,23 +5860,6 @@
         <a:font script="Viet" typeface="Times New Roman"/>
         <a:font script="Uigh" typeface="Microsoft Uighur"/>
         <a:font script="Geor" typeface="Sylfaen"/>
-        <a:font script="Armn" typeface="Arial"/>
-        <a:font script="Bugi" typeface="Leelawadee UI"/>
-        <a:font script="Bopo" typeface="Microsoft JhengHei"/>
-        <a:font script="Java" typeface="Javanese Text"/>
-        <a:font script="Lisu" typeface="Segoe UI"/>
-        <a:font script="Mymr" typeface="Myanmar Text"/>
-        <a:font script="Nkoo" typeface="Ebrima"/>
-        <a:font script="Olck" typeface="Nirmala UI"/>
-        <a:font script="Osma" typeface="Ebrima"/>
-        <a:font script="Phag" typeface="Phagspa"/>
-        <a:font script="Syrn" typeface="Estrangelo Edessa"/>
-        <a:font script="Syrj" typeface="Estrangelo Edessa"/>
-        <a:font script="Syre" typeface="Estrangelo Edessa"/>
-        <a:font script="Sora" typeface="Nirmala UI"/>
-        <a:font script="Tale" typeface="Microsoft Tai Le"/>
-        <a:font script="Talu" typeface="Microsoft New Tai Lue"/>
-        <a:font script="Tfng" typeface="Ebrima"/>
       </a:majorFont>
       <a:minorFont>
         <a:latin typeface="Calibri" panose="020F0502020204030204"/>
@@ -4322,26 +5895,9 @@
         <a:font script="Viet" typeface="Arial"/>
         <a:font script="Uigh" typeface="Microsoft Uighur"/>
         <a:font script="Geor" typeface="Sylfaen"/>
-        <a:font script="Armn" typeface="Arial"/>
-        <a:font script="Bugi" typeface="Leelawadee UI"/>
-        <a:font script="Bopo" typeface="Microsoft JhengHei"/>
-        <a:font script="Java" typeface="Javanese Text"/>
-        <a:font script="Lisu" typeface="Segoe UI"/>
-        <a:font script="Mymr" typeface="Myanmar Text"/>
-        <a:font script="Nkoo" typeface="Ebrima"/>
-        <a:font script="Olck" typeface="Nirmala UI"/>
-        <a:font script="Osma" typeface="Ebrima"/>
-        <a:font script="Phag" typeface="Phagspa"/>
-        <a:font script="Syrn" typeface="Estrangelo Edessa"/>
-        <a:font script="Syrj" typeface="Estrangelo Edessa"/>
-        <a:font script="Syre" typeface="Estrangelo Edessa"/>
-        <a:font script="Sora" typeface="Nirmala UI"/>
-        <a:font script="Tale" typeface="Microsoft Tai Le"/>
-        <a:font script="Talu" typeface="Microsoft New Tai Lue"/>
-        <a:font script="Tfng" typeface="Ebrima"/>
       </a:minorFont>
     </a:fontScheme>
-    <a:fmtScheme name="Office">
+    <a:fmtScheme name="Office Theme">
       <a:fillStyleLst>
         <a:solidFill>
           <a:schemeClr val="phClr"/>

</xml_diff>